<commit_message>
final ppt for review
</commit_message>
<xml_diff>
--- a/Final Submission/Presidential Election Analysis_Final.pptx
+++ b/Final Submission/Presidential Election Analysis_Final.pptx
@@ -19,7 +19,7 @@
     <p:sldId id="294" r:id="rId10"/>
     <p:sldId id="291" r:id="rId11"/>
     <p:sldId id="292" r:id="rId12"/>
-    <p:sldId id="295" r:id="rId13"/>
+    <p:sldId id="302" r:id="rId13"/>
     <p:sldId id="284" r:id="rId14"/>
     <p:sldId id="296" r:id="rId15"/>
     <p:sldId id="301" r:id="rId16"/>
@@ -167,7 +167,7 @@
             <p14:sldId id="294"/>
             <p14:sldId id="291"/>
             <p14:sldId id="292"/>
-            <p14:sldId id="295"/>
+            <p14:sldId id="302"/>
             <p14:sldId id="284"/>
             <p14:sldId id="296"/>
             <p14:sldId id="301"/>
@@ -7957,7 +7957,7 @@
       </p:grpSpPr>
       <p:sp>
         <p:nvSpPr>
-          <p:cNvPr id="25" name="Rectangle: Rounded Corners 24">
+          <p:cNvPr id="25" name="Rectangle 24">
             <a:extLst>
               <a:ext uri="{FF2B5EF4-FFF2-40B4-BE49-F238E27FC236}">
                 <a16:creationId xmlns:a16="http://schemas.microsoft.com/office/drawing/2014/main" id="{182AF2A2-2D86-42E6-83FF-C772A0A50C4A}"/>
@@ -7972,7 +7972,7 @@
             <a:off x="411481" y="1546995"/>
             <a:ext cx="3474719" cy="4885964"/>
           </a:xfrm>
-          <a:prstGeom prst="roundRect">
+          <a:prstGeom prst="rect">
             <a:avLst/>
           </a:prstGeom>
           <a:noFill/>
@@ -8686,6 +8686,59 @@
       </p:grpSpPr>
       <p:sp>
         <p:nvSpPr>
+          <p:cNvPr id="12" name="Rectangle: Diagonal Corners Rounded 11">
+            <a:extLst>
+              <a:ext uri="{FF2B5EF4-FFF2-40B4-BE49-F238E27FC236}">
+                <a16:creationId xmlns:a16="http://schemas.microsoft.com/office/drawing/2014/main" id="{67EC419A-46E8-41F0-8033-0EBE0310D1ED}"/>
+              </a:ext>
+            </a:extLst>
+          </p:cNvPr>
+          <p:cNvSpPr/>
+          <p:nvPr/>
+        </p:nvSpPr>
+        <p:spPr>
+          <a:xfrm>
+            <a:off x="5125617" y="2809740"/>
+            <a:ext cx="3789782" cy="2886150"/>
+          </a:xfrm>
+          <a:prstGeom prst="round2DiagRect">
+            <a:avLst/>
+          </a:prstGeom>
+          <a:solidFill>
+            <a:schemeClr val="bg1">
+              <a:lumMod val="95000"/>
+            </a:schemeClr>
+          </a:solidFill>
+          <a:ln>
+            <a:noFill/>
+          </a:ln>
+          <a:effectLst/>
+        </p:spPr>
+        <p:style>
+          <a:lnRef idx="1">
+            <a:schemeClr val="accent1"/>
+          </a:lnRef>
+          <a:fillRef idx="3">
+            <a:schemeClr val="accent1"/>
+          </a:fillRef>
+          <a:effectRef idx="2">
+            <a:schemeClr val="accent1"/>
+          </a:effectRef>
+          <a:fontRef idx="minor">
+            <a:schemeClr val="lt1"/>
+          </a:fontRef>
+        </p:style>
+        <p:txBody>
+          <a:bodyPr rtlCol="0" anchor="ctr"/>
+          <a:lstStyle/>
+          <a:p>
+            <a:pPr algn="ctr"/>
+            <a:endParaRPr lang="en-US"/>
+          </a:p>
+        </p:txBody>
+      </p:sp>
+      <p:sp>
+        <p:nvSpPr>
           <p:cNvPr id="7" name="Content Placeholder 1">
             <a:extLst>
               <a:ext uri="{FF2B5EF4-FFF2-40B4-BE49-F238E27FC236}">
@@ -8943,6 +8996,435 @@
           </a:p>
         </p:txBody>
       </p:sp>
+      <p:pic>
+        <p:nvPicPr>
+          <p:cNvPr id="4" name="Picture 3" descr="Text&#10;&#10;Description automatically generated">
+            <a:extLst>
+              <a:ext uri="{FF2B5EF4-FFF2-40B4-BE49-F238E27FC236}">
+                <a16:creationId xmlns:a16="http://schemas.microsoft.com/office/drawing/2014/main" id="{DA764B60-903E-476E-B56D-AC31A1DD280E}"/>
+              </a:ext>
+            </a:extLst>
+          </p:cNvPr>
+          <p:cNvPicPr>
+            <a:picLocks noChangeAspect="1"/>
+          </p:cNvPicPr>
+          <p:nvPr/>
+        </p:nvPicPr>
+        <p:blipFill rotWithShape="1">
+          <a:blip r:embed="rId2"/>
+          <a:srcRect l="18881" t="15063" r="19004" b="14892"/>
+          <a:stretch/>
+        </p:blipFill>
+        <p:spPr>
+          <a:xfrm>
+            <a:off x="597556" y="1524001"/>
+            <a:ext cx="894914" cy="1009159"/>
+          </a:xfrm>
+          <a:prstGeom prst="rect">
+            <a:avLst/>
+          </a:prstGeom>
+        </p:spPr>
+      </p:pic>
+      <p:sp>
+        <p:nvSpPr>
+          <p:cNvPr id="6" name="TextBox 5">
+            <a:extLst>
+              <a:ext uri="{FF2B5EF4-FFF2-40B4-BE49-F238E27FC236}">
+                <a16:creationId xmlns:a16="http://schemas.microsoft.com/office/drawing/2014/main" id="{5A03712A-621C-4C7D-B2BF-63121A91D93D}"/>
+              </a:ext>
+            </a:extLst>
+          </p:cNvPr>
+          <p:cNvSpPr txBox="1"/>
+          <p:nvPr/>
+        </p:nvSpPr>
+        <p:spPr>
+          <a:xfrm>
+            <a:off x="1752599" y="1524001"/>
+            <a:ext cx="7162800" cy="1056700"/>
+          </a:xfrm>
+          <a:prstGeom prst="rect">
+            <a:avLst/>
+          </a:prstGeom>
+          <a:noFill/>
+        </p:spPr>
+        <p:txBody>
+          <a:bodyPr wrap="square" numCol="2" rtlCol="0">
+            <a:spAutoFit/>
+          </a:bodyPr>
+          <a:lstStyle/>
+          <a:p>
+            <a:pPr marL="285750" indent="-285750">
+              <a:spcAft>
+                <a:spcPts val="400"/>
+              </a:spcAft>
+              <a:buFont typeface="Wingdings" pitchFamily="2" charset="2"/>
+              <a:buChar char="§"/>
+            </a:pPr>
+            <a:r>
+              <a:rPr lang="en-US" sz="1300" dirty="0">
+                <a:latin typeface="+mn-lt"/>
+              </a:rPr>
+              <a:t>Unemployment Rate</a:t>
+            </a:r>
+          </a:p>
+          <a:p>
+            <a:pPr marL="285750" indent="-285750">
+              <a:spcAft>
+                <a:spcPts val="400"/>
+              </a:spcAft>
+              <a:buFont typeface="Wingdings" pitchFamily="2" charset="2"/>
+              <a:buChar char="§"/>
+            </a:pPr>
+            <a:r>
+              <a:rPr lang="en-US" sz="1300" dirty="0">
+                <a:latin typeface="+mn-lt"/>
+              </a:rPr>
+              <a:t>Race (African American, American Indian, Asian, White)</a:t>
+            </a:r>
+          </a:p>
+          <a:p>
+            <a:pPr marL="285750" indent="-285750">
+              <a:spcAft>
+                <a:spcPts val="400"/>
+              </a:spcAft>
+              <a:buFont typeface="Wingdings" pitchFamily="2" charset="2"/>
+              <a:buChar char="§"/>
+            </a:pPr>
+            <a:r>
+              <a:rPr lang="en-US" sz="1300" dirty="0">
+                <a:latin typeface="+mn-lt"/>
+              </a:rPr>
+              <a:t>Median Household Income</a:t>
+            </a:r>
+          </a:p>
+          <a:p>
+            <a:pPr marL="285750" indent="-285750">
+              <a:spcAft>
+                <a:spcPts val="400"/>
+              </a:spcAft>
+              <a:buFont typeface="Wingdings" pitchFamily="2" charset="2"/>
+              <a:buChar char="§"/>
+            </a:pPr>
+            <a:r>
+              <a:rPr lang="en-US" sz="1300" dirty="0">
+                <a:latin typeface="+mn-lt"/>
+              </a:rPr>
+              <a:t>Poverty Estimators</a:t>
+            </a:r>
+          </a:p>
+          <a:p>
+            <a:pPr marL="285750" indent="-285750">
+              <a:spcAft>
+                <a:spcPts val="400"/>
+              </a:spcAft>
+              <a:buFont typeface="Wingdings" pitchFamily="2" charset="2"/>
+              <a:buChar char="§"/>
+            </a:pPr>
+            <a:r>
+              <a:rPr lang="en-US" sz="1300" dirty="0">
+                <a:latin typeface="+mn-lt"/>
+              </a:rPr>
+              <a:t>Educational Attainments (Diploma, Bachelor, Masters, PhD.)</a:t>
+            </a:r>
+          </a:p>
+          <a:p>
+            <a:pPr marL="285750" indent="-285750">
+              <a:spcAft>
+                <a:spcPts val="400"/>
+              </a:spcAft>
+              <a:buFont typeface="Wingdings" pitchFamily="2" charset="2"/>
+              <a:buChar char="§"/>
+            </a:pPr>
+            <a:r>
+              <a:rPr lang="en-US" sz="1300" dirty="0">
+                <a:latin typeface="+mn-lt"/>
+              </a:rPr>
+              <a:t>Migration Rates</a:t>
+            </a:r>
+          </a:p>
+        </p:txBody>
+      </p:sp>
+      <p:pic>
+        <p:nvPicPr>
+          <p:cNvPr id="8" name="Picture 7" descr="Table&#10;&#10;Description automatically generated">
+            <a:extLst>
+              <a:ext uri="{FF2B5EF4-FFF2-40B4-BE49-F238E27FC236}">
+                <a16:creationId xmlns:a16="http://schemas.microsoft.com/office/drawing/2014/main" id="{5EEEAF10-CEE6-4CC1-A2FD-E09B6039C29A}"/>
+              </a:ext>
+            </a:extLst>
+          </p:cNvPr>
+          <p:cNvPicPr>
+            <a:picLocks noChangeAspect="1"/>
+          </p:cNvPicPr>
+          <p:nvPr/>
+        </p:nvPicPr>
+        <p:blipFill rotWithShape="1">
+          <a:blip r:embed="rId3"/>
+          <a:srcRect l="1342" r="6040"/>
+          <a:stretch/>
+        </p:blipFill>
+        <p:spPr>
+          <a:xfrm>
+            <a:off x="489081" y="2809740"/>
+            <a:ext cx="4267200" cy="2824186"/>
+          </a:xfrm>
+          <a:prstGeom prst="rect">
+            <a:avLst/>
+          </a:prstGeom>
+        </p:spPr>
+      </p:pic>
+      <p:sp>
+        <p:nvSpPr>
+          <p:cNvPr id="9" name="TextBox 8">
+            <a:extLst>
+              <a:ext uri="{FF2B5EF4-FFF2-40B4-BE49-F238E27FC236}">
+                <a16:creationId xmlns:a16="http://schemas.microsoft.com/office/drawing/2014/main" id="{A982735A-D940-4B8C-B1B1-61052106992D}"/>
+              </a:ext>
+            </a:extLst>
+          </p:cNvPr>
+          <p:cNvSpPr txBox="1"/>
+          <p:nvPr/>
+        </p:nvSpPr>
+        <p:spPr>
+          <a:xfrm>
+            <a:off x="5125617" y="3162845"/>
+            <a:ext cx="3785117" cy="2513509"/>
+          </a:xfrm>
+          <a:prstGeom prst="rect">
+            <a:avLst/>
+          </a:prstGeom>
+          <a:noFill/>
+        </p:spPr>
+        <p:txBody>
+          <a:bodyPr wrap="square" numCol="1" rtlCol="0">
+            <a:spAutoFit/>
+          </a:bodyPr>
+          <a:lstStyle/>
+          <a:p>
+            <a:pPr marL="285750" indent="-285750">
+              <a:spcAft>
+                <a:spcPts val="400"/>
+              </a:spcAft>
+              <a:buFont typeface="Wingdings" pitchFamily="2" charset="2"/>
+              <a:buChar char="Ø"/>
+            </a:pPr>
+            <a:r>
+              <a:rPr lang="en-US" sz="1200" dirty="0">
+                <a:latin typeface="+mn-lt"/>
+              </a:rPr>
+              <a:t>For every percentage of increase in African American population, 0.8 percent of democratic votes should increase</a:t>
+            </a:r>
+            <a:br>
+              <a:rPr lang="en-US" sz="1200" dirty="0">
+                <a:latin typeface="+mn-lt"/>
+              </a:rPr>
+            </a:br>
+            <a:endParaRPr lang="en-US" sz="1200" dirty="0">
+              <a:latin typeface="+mn-lt"/>
+            </a:endParaRPr>
+          </a:p>
+          <a:p>
+            <a:pPr marL="285750" indent="-285750">
+              <a:spcAft>
+                <a:spcPts val="400"/>
+              </a:spcAft>
+              <a:buFont typeface="Wingdings" pitchFamily="2" charset="2"/>
+              <a:buChar char="Ø"/>
+            </a:pPr>
+            <a:endParaRPr lang="en-US" sz="1200" dirty="0">
+              <a:latin typeface="+mn-lt"/>
+            </a:endParaRPr>
+          </a:p>
+          <a:p>
+            <a:pPr marL="285750" indent="-285750">
+              <a:spcAft>
+                <a:spcPts val="400"/>
+              </a:spcAft>
+              <a:buFont typeface="Wingdings" pitchFamily="2" charset="2"/>
+              <a:buChar char="Ø"/>
+            </a:pPr>
+            <a:r>
+              <a:rPr lang="en-US" sz="1200" dirty="0">
+                <a:latin typeface="+mn-lt"/>
+              </a:rPr>
+              <a:t>For every percentage of decrease in unemployment rate, 0.02 percent of democratic should increase.</a:t>
+            </a:r>
+            <a:br>
+              <a:rPr lang="en-US" sz="1200" dirty="0">
+                <a:latin typeface="+mn-lt"/>
+              </a:rPr>
+            </a:br>
+            <a:endParaRPr lang="en-US" sz="1200" dirty="0">
+              <a:latin typeface="+mn-lt"/>
+            </a:endParaRPr>
+          </a:p>
+          <a:p>
+            <a:pPr>
+              <a:spcAft>
+                <a:spcPts val="400"/>
+              </a:spcAft>
+            </a:pPr>
+            <a:endParaRPr lang="en-US" sz="1200" dirty="0">
+              <a:latin typeface="+mn-lt"/>
+            </a:endParaRPr>
+          </a:p>
+          <a:p>
+            <a:pPr marL="285750" indent="-285750">
+              <a:spcAft>
+                <a:spcPts val="400"/>
+              </a:spcAft>
+              <a:buFont typeface="Wingdings" pitchFamily="2" charset="2"/>
+              <a:buChar char="Ø"/>
+            </a:pPr>
+            <a:r>
+              <a:rPr lang="en-US" sz="1200" dirty="0">
+                <a:latin typeface="+mn-lt"/>
+              </a:rPr>
+              <a:t>For educational attainment increase in the country, around 0.05 percent increase should be in democrat votes</a:t>
+            </a:r>
+          </a:p>
+        </p:txBody>
+      </p:sp>
+      <p:sp>
+        <p:nvSpPr>
+          <p:cNvPr id="10" name="TextBox 9">
+            <a:extLst>
+              <a:ext uri="{FF2B5EF4-FFF2-40B4-BE49-F238E27FC236}">
+                <a16:creationId xmlns:a16="http://schemas.microsoft.com/office/drawing/2014/main" id="{FB1F0A7D-5430-4D04-9496-1C27B940D7CB}"/>
+              </a:ext>
+            </a:extLst>
+          </p:cNvPr>
+          <p:cNvSpPr txBox="1"/>
+          <p:nvPr/>
+        </p:nvSpPr>
+        <p:spPr>
+          <a:xfrm>
+            <a:off x="2089281" y="6060388"/>
+            <a:ext cx="5334000" cy="400110"/>
+          </a:xfrm>
+          <a:prstGeom prst="rect">
+            <a:avLst/>
+          </a:prstGeom>
+          <a:noFill/>
+        </p:spPr>
+        <p:txBody>
+          <a:bodyPr wrap="square" rtlCol="0">
+            <a:spAutoFit/>
+          </a:bodyPr>
+          <a:lstStyle/>
+          <a:p>
+            <a:r>
+              <a:rPr lang="en-US" sz="2000" b="1" dirty="0">
+                <a:solidFill>
+                  <a:srgbClr val="C1202F"/>
+                </a:solidFill>
+                <a:latin typeface="+mn-lt"/>
+              </a:rPr>
+              <a:t>R-Square: 0.6851  	Adjusted R-Square: 0.7038</a:t>
+            </a:r>
+          </a:p>
+        </p:txBody>
+      </p:sp>
+      <p:pic>
+        <p:nvPicPr>
+          <p:cNvPr id="3" name="Picture 2" descr="Icon&#10;&#10;Description automatically generated">
+            <a:extLst>
+              <a:ext uri="{FF2B5EF4-FFF2-40B4-BE49-F238E27FC236}">
+                <a16:creationId xmlns:a16="http://schemas.microsoft.com/office/drawing/2014/main" id="{450DD9BB-B42A-4AA7-8685-1D575B9F4788}"/>
+              </a:ext>
+            </a:extLst>
+          </p:cNvPr>
+          <p:cNvPicPr>
+            <a:picLocks noChangeAspect="1"/>
+          </p:cNvPicPr>
+          <p:nvPr/>
+        </p:nvPicPr>
+        <p:blipFill>
+          <a:blip r:embed="rId4">
+            <a:extLst>
+              <a:ext uri="{BEBA8EAE-BF5A-486C-A8C5-ECC9F3942E4B}">
+                <a14:imgProps xmlns:a14="http://schemas.microsoft.com/office/drawing/2010/main">
+                  <a14:imgLayer r:embed="rId5">
+                    <a14:imgEffect>
+                      <a14:backgroundRemoval t="5290" b="91598" l="6628" r="94070">
+                        <a14:foregroundMark x1="6628" y1="19813" x2="8837" y2="25622"/>
+                        <a14:foregroundMark x1="28837" y1="14212" x2="54186" y2="40560"/>
+                        <a14:foregroundMark x1="54186" y1="40560" x2="54186" y2="40249"/>
+                        <a14:foregroundMark x1="51628" y1="19295" x2="73837" y2="8714"/>
+                        <a14:foregroundMark x1="94070" y1="14834" x2="93488" y2="21577"/>
+                        <a14:foregroundMark x1="42558" y1="91701" x2="50698" y2="91701"/>
+                        <a14:foregroundMark x1="21628" y1="5290" x2="23837" y2="5290"/>
+                      </a14:backgroundRemoval>
+                    </a14:imgEffect>
+                  </a14:imgLayer>
+                </a14:imgProps>
+              </a:ext>
+            </a:extLst>
+          </a:blip>
+          <a:stretch>
+            <a:fillRect/>
+          </a:stretch>
+        </p:blipFill>
+        <p:spPr>
+          <a:xfrm>
+            <a:off x="1492470" y="5968857"/>
+            <a:ext cx="520257" cy="583172"/>
+          </a:xfrm>
+          <a:prstGeom prst="rect">
+            <a:avLst/>
+          </a:prstGeom>
+        </p:spPr>
+      </p:pic>
+      <p:pic>
+        <p:nvPicPr>
+          <p:cNvPr id="11" name="Picture 10" descr="Icon&#10;&#10;Description automatically generated">
+            <a:extLst>
+              <a:ext uri="{FF2B5EF4-FFF2-40B4-BE49-F238E27FC236}">
+                <a16:creationId xmlns:a16="http://schemas.microsoft.com/office/drawing/2014/main" id="{6A28C97D-AF2A-4505-8C79-3A469418DDE9}"/>
+              </a:ext>
+            </a:extLst>
+          </p:cNvPr>
+          <p:cNvPicPr>
+            <a:picLocks noChangeAspect="1"/>
+          </p:cNvPicPr>
+          <p:nvPr/>
+        </p:nvPicPr>
+        <p:blipFill>
+          <a:blip r:embed="rId4">
+            <a:extLst>
+              <a:ext uri="{BEBA8EAE-BF5A-486C-A8C5-ECC9F3942E4B}">
+                <a14:imgProps xmlns:a14="http://schemas.microsoft.com/office/drawing/2010/main">
+                  <a14:imgLayer r:embed="rId5">
+                    <a14:imgEffect>
+                      <a14:backgroundRemoval t="5290" b="91598" l="6628" r="94070">
+                        <a14:foregroundMark x1="6628" y1="19813" x2="8837" y2="25622"/>
+                        <a14:foregroundMark x1="28837" y1="14212" x2="54186" y2="40560"/>
+                        <a14:foregroundMark x1="54186" y1="40560" x2="54186" y2="40249"/>
+                        <a14:foregroundMark x1="51628" y1="19295" x2="73837" y2="8714"/>
+                        <a14:foregroundMark x1="94070" y1="14834" x2="93488" y2="21577"/>
+                        <a14:foregroundMark x1="42558" y1="91701" x2="50698" y2="91701"/>
+                        <a14:foregroundMark x1="21628" y1="5290" x2="23837" y2="5290"/>
+                      </a14:backgroundRemoval>
+                    </a14:imgEffect>
+                  </a14:imgLayer>
+                </a14:imgProps>
+              </a:ext>
+            </a:extLst>
+          </a:blip>
+          <a:stretch>
+            <a:fillRect/>
+          </a:stretch>
+        </p:blipFill>
+        <p:spPr>
+          <a:xfrm>
+            <a:off x="7423281" y="5968857"/>
+            <a:ext cx="520257" cy="583172"/>
+          </a:xfrm>
+          <a:prstGeom prst="rect">
+            <a:avLst/>
+          </a:prstGeom>
+        </p:spPr>
+      </p:pic>
     </p:spTree>
     <p:extLst>
       <p:ext uri="{BB962C8B-B14F-4D97-AF65-F5344CB8AC3E}">
@@ -8975,71 +9457,278 @@
       </p:grpSpPr>
       <p:sp>
         <p:nvSpPr>
-          <p:cNvPr id="2" name="Content Placeholder 1">
+          <p:cNvPr id="12" name="Rectangle: Diagonal Corners Rounded 11">
             <a:extLst>
               <a:ext uri="{FF2B5EF4-FFF2-40B4-BE49-F238E27FC236}">
-                <a16:creationId xmlns:a16="http://schemas.microsoft.com/office/drawing/2014/main" id="{9DA68DEC-C01D-F84E-A131-FCFD04704A6E}"/>
+                <a16:creationId xmlns:a16="http://schemas.microsoft.com/office/drawing/2014/main" id="{67EC419A-46E8-41F0-8033-0EBE0310D1ED}"/>
               </a:ext>
             </a:extLst>
           </p:cNvPr>
-          <p:cNvSpPr>
-            <a:spLocks noGrp="1"/>
+          <p:cNvSpPr/>
+          <p:nvPr/>
+        </p:nvSpPr>
+        <p:spPr>
+          <a:xfrm>
+            <a:off x="5125617" y="2809740"/>
+            <a:ext cx="3789782" cy="2886150"/>
+          </a:xfrm>
+          <a:prstGeom prst="round2DiagRect">
+            <a:avLst/>
+          </a:prstGeom>
+          <a:solidFill>
+            <a:schemeClr val="bg1">
+              <a:lumMod val="95000"/>
+            </a:schemeClr>
+          </a:solidFill>
+          <a:ln>
+            <a:noFill/>
+          </a:ln>
+          <a:effectLst/>
+        </p:spPr>
+        <p:style>
+          <a:lnRef idx="1">
+            <a:schemeClr val="accent1"/>
+          </a:lnRef>
+          <a:fillRef idx="3">
+            <a:schemeClr val="accent1"/>
+          </a:fillRef>
+          <a:effectRef idx="2">
+            <a:schemeClr val="accent1"/>
+          </a:effectRef>
+          <a:fontRef idx="minor">
+            <a:schemeClr val="lt1"/>
+          </a:fontRef>
+        </p:style>
+        <p:txBody>
+          <a:bodyPr rtlCol="0" anchor="ctr"/>
+          <a:lstStyle/>
+          <a:p>
+            <a:pPr algn="ctr"/>
+            <a:endParaRPr lang="en-US"/>
+          </a:p>
+        </p:txBody>
+      </p:sp>
+      <p:sp>
+        <p:nvSpPr>
+          <p:cNvPr id="7" name="Content Placeholder 1">
+            <a:extLst>
+              <a:ext uri="{FF2B5EF4-FFF2-40B4-BE49-F238E27FC236}">
+                <a16:creationId xmlns:a16="http://schemas.microsoft.com/office/drawing/2014/main" id="{D7792D65-0D51-0742-BB11-BE4EEF40D16B}"/>
+              </a:ext>
+            </a:extLst>
+          </p:cNvPr>
+          <p:cNvSpPr txBox="1">
+            <a:spLocks/>
           </p:cNvSpPr>
-          <p:nvPr>
-            <p:ph idx="1"/>
-          </p:nvPr>
+          <p:nvPr/>
         </p:nvSpPr>
-        <p:spPr/>
+        <p:spPr bwMode="auto">
+          <a:xfrm>
+            <a:off x="533400" y="4419600"/>
+            <a:ext cx="8229600" cy="1676400"/>
+          </a:xfrm>
+          <a:prstGeom prst="rect">
+            <a:avLst/>
+          </a:prstGeom>
+          <a:noFill/>
+          <a:ln>
+            <a:noFill/>
+          </a:ln>
+          <a:extLst>
+            <a:ext uri="{909E8E84-426E-40DD-AFC4-6F175D3DCCD1}">
+              <a14:hiddenFill xmlns:a14="http://schemas.microsoft.com/office/drawing/2010/main">
+                <a:solidFill>
+                  <a:srgbClr val="FFFFFF"/>
+                </a:solidFill>
+              </a14:hiddenFill>
+            </a:ext>
+            <a:ext uri="{91240B29-F687-4F45-9708-019B960494DF}">
+              <a14:hiddenLine xmlns:a14="http://schemas.microsoft.com/office/drawing/2010/main" w="9525">
+                <a:solidFill>
+                  <a:srgbClr val="000000"/>
+                </a:solidFill>
+                <a:miter lim="800000"/>
+                <a:headEnd/>
+                <a:tailEnd/>
+              </a14:hiddenLine>
+            </a:ext>
+          </a:extLst>
+        </p:spPr>
         <p:txBody>
-          <a:bodyPr/>
-          <a:lstStyle/>
-          <a:p>
-            <a:r>
-              <a:rPr lang="en-US" dirty="0" err="1"/>
-              <a:t>rmse</a:t>
-            </a:r>
-            <a:r>
-              <a:rPr lang="en-US" dirty="0"/>
-              <a:t>(</a:t>
-            </a:r>
-            <a:r>
-              <a:rPr lang="en-US" dirty="0" err="1"/>
-              <a:t>test_y</a:t>
-            </a:r>
-            <a:r>
-              <a:rPr lang="en-US" dirty="0"/>
-              <a:t>, predict.lasso.1se)</a:t>
-            </a:r>
-          </a:p>
-          <a:p>
-            <a:r>
-              <a:rPr lang="en-US" dirty="0"/>
-              <a:t>0.1251411</a:t>
-            </a:r>
-          </a:p>
-          <a:p>
-            <a:r>
-              <a:rPr lang="en-US" dirty="0" err="1"/>
-              <a:t>mape</a:t>
-            </a:r>
-            <a:r>
-              <a:rPr lang="en-US" dirty="0"/>
-              <a:t>(</a:t>
-            </a:r>
-            <a:r>
-              <a:rPr lang="en-US" dirty="0" err="1"/>
-              <a:t>test_y</a:t>
-            </a:r>
-            <a:r>
-              <a:rPr lang="en-US" dirty="0"/>
-              <a:t>, predict.lasso.1se)</a:t>
-            </a:r>
-          </a:p>
-          <a:p>
-            <a:r>
-              <a:rPr lang="en-US" dirty="0"/>
-              <a:t>0.4979245</a:t>
-            </a:r>
+          <a:bodyPr vert="horz" wrap="square" lIns="91440" tIns="45720" rIns="91440" bIns="45720" numCol="1" anchor="t" anchorCtr="0" compatLnSpc="1">
+            <a:prstTxWarp prst="textNoShape">
+              <a:avLst/>
+            </a:prstTxWarp>
+          </a:bodyPr>
+          <a:lstStyle>
+            <a:lvl1pPr marL="342900" indent="-342900" algn="l" defTabSz="457200" rtl="0" eaLnBrk="0" fontAlgn="base" hangingPunct="0">
+              <a:spcBef>
+                <a:spcPct val="20000"/>
+              </a:spcBef>
+              <a:spcAft>
+                <a:spcPct val="0"/>
+              </a:spcAft>
+              <a:buFont typeface="Arial" panose="020B0604020202020204" pitchFamily="34" charset="0"/>
+              <a:buChar char="•"/>
+              <a:defRPr sz="3200" kern="1200">
+                <a:solidFill>
+                  <a:schemeClr val="tx1"/>
+                </a:solidFill>
+                <a:latin typeface="Helvetica"/>
+                <a:ea typeface="ＭＳ Ｐゴシック" charset="0"/>
+                <a:cs typeface="ＭＳ Ｐゴシック" charset="0"/>
+              </a:defRPr>
+            </a:lvl1pPr>
+            <a:lvl2pPr marL="742950" indent="-285750" algn="l" defTabSz="457200" rtl="0" eaLnBrk="0" fontAlgn="base" hangingPunct="0">
+              <a:spcBef>
+                <a:spcPct val="20000"/>
+              </a:spcBef>
+              <a:spcAft>
+                <a:spcPct val="0"/>
+              </a:spcAft>
+              <a:buFont typeface="Arial" panose="020B0604020202020204" pitchFamily="34" charset="0"/>
+              <a:buChar char="–"/>
+              <a:defRPr sz="2800" kern="1200">
+                <a:solidFill>
+                  <a:schemeClr val="tx1"/>
+                </a:solidFill>
+                <a:latin typeface="Helvetica"/>
+                <a:ea typeface="ＭＳ Ｐゴシック" charset="0"/>
+                <a:cs typeface="+mn-cs"/>
+              </a:defRPr>
+            </a:lvl2pPr>
+            <a:lvl3pPr marL="1143000" indent="-228600" algn="l" defTabSz="457200" rtl="0" eaLnBrk="0" fontAlgn="base" hangingPunct="0">
+              <a:spcBef>
+                <a:spcPct val="20000"/>
+              </a:spcBef>
+              <a:spcAft>
+                <a:spcPct val="0"/>
+              </a:spcAft>
+              <a:buFont typeface="Arial" panose="020B0604020202020204" pitchFamily="34" charset="0"/>
+              <a:buChar char="•"/>
+              <a:defRPr sz="2400" kern="1200">
+                <a:solidFill>
+                  <a:schemeClr val="tx1"/>
+                </a:solidFill>
+                <a:latin typeface="Helvetica"/>
+                <a:ea typeface="ＭＳ Ｐゴシック" charset="0"/>
+                <a:cs typeface="+mn-cs"/>
+              </a:defRPr>
+            </a:lvl3pPr>
+            <a:lvl4pPr marL="1600200" indent="-228600" algn="l" defTabSz="457200" rtl="0" eaLnBrk="0" fontAlgn="base" hangingPunct="0">
+              <a:spcBef>
+                <a:spcPct val="20000"/>
+              </a:spcBef>
+              <a:spcAft>
+                <a:spcPct val="0"/>
+              </a:spcAft>
+              <a:buFont typeface="Arial" panose="020B0604020202020204" pitchFamily="34" charset="0"/>
+              <a:buChar char="–"/>
+              <a:defRPr sz="2000" kern="1200">
+                <a:solidFill>
+                  <a:schemeClr val="tx1"/>
+                </a:solidFill>
+                <a:latin typeface="Helvetica"/>
+                <a:ea typeface="ＭＳ Ｐゴシック" charset="0"/>
+                <a:cs typeface="+mn-cs"/>
+              </a:defRPr>
+            </a:lvl4pPr>
+            <a:lvl5pPr marL="2057400" indent="-228600" algn="l" defTabSz="457200" rtl="0" eaLnBrk="0" fontAlgn="base" hangingPunct="0">
+              <a:spcBef>
+                <a:spcPct val="20000"/>
+              </a:spcBef>
+              <a:spcAft>
+                <a:spcPct val="0"/>
+              </a:spcAft>
+              <a:buFont typeface="Arial" panose="020B0604020202020204" pitchFamily="34" charset="0"/>
+              <a:buChar char="»"/>
+              <a:defRPr sz="2000" kern="1200">
+                <a:solidFill>
+                  <a:schemeClr val="tx1"/>
+                </a:solidFill>
+                <a:latin typeface="Helvetica"/>
+                <a:ea typeface="ＭＳ Ｐゴシック" charset="0"/>
+                <a:cs typeface="+mn-cs"/>
+              </a:defRPr>
+            </a:lvl5pPr>
+            <a:lvl6pPr marL="2514600" indent="-228600" algn="l" defTabSz="457200" rtl="0" eaLnBrk="1" latinLnBrk="0" hangingPunct="1">
+              <a:spcBef>
+                <a:spcPct val="20000"/>
+              </a:spcBef>
+              <a:buFont typeface="Arial"/>
+              <a:buChar char="•"/>
+              <a:defRPr sz="2000" kern="1200">
+                <a:solidFill>
+                  <a:schemeClr val="tx1"/>
+                </a:solidFill>
+                <a:latin typeface="+mn-lt"/>
+                <a:ea typeface="+mn-ea"/>
+                <a:cs typeface="+mn-cs"/>
+              </a:defRPr>
+            </a:lvl6pPr>
+            <a:lvl7pPr marL="2971800" indent="-228600" algn="l" defTabSz="457200" rtl="0" eaLnBrk="1" latinLnBrk="0" hangingPunct="1">
+              <a:spcBef>
+                <a:spcPct val="20000"/>
+              </a:spcBef>
+              <a:buFont typeface="Arial"/>
+              <a:buChar char="•"/>
+              <a:defRPr sz="2000" kern="1200">
+                <a:solidFill>
+                  <a:schemeClr val="tx1"/>
+                </a:solidFill>
+                <a:latin typeface="+mn-lt"/>
+                <a:ea typeface="+mn-ea"/>
+                <a:cs typeface="+mn-cs"/>
+              </a:defRPr>
+            </a:lvl7pPr>
+            <a:lvl8pPr marL="3429000" indent="-228600" algn="l" defTabSz="457200" rtl="0" eaLnBrk="1" latinLnBrk="0" hangingPunct="1">
+              <a:spcBef>
+                <a:spcPct val="20000"/>
+              </a:spcBef>
+              <a:buFont typeface="Arial"/>
+              <a:buChar char="•"/>
+              <a:defRPr sz="2000" kern="1200">
+                <a:solidFill>
+                  <a:schemeClr val="tx1"/>
+                </a:solidFill>
+                <a:latin typeface="+mn-lt"/>
+                <a:ea typeface="+mn-ea"/>
+                <a:cs typeface="+mn-cs"/>
+              </a:defRPr>
+            </a:lvl8pPr>
+            <a:lvl9pPr marL="3886200" indent="-228600" algn="l" defTabSz="457200" rtl="0" eaLnBrk="1" latinLnBrk="0" hangingPunct="1">
+              <a:spcBef>
+                <a:spcPct val="20000"/>
+              </a:spcBef>
+              <a:buFont typeface="Arial"/>
+              <a:buChar char="•"/>
+              <a:defRPr sz="2000" kern="1200">
+                <a:solidFill>
+                  <a:schemeClr val="tx1"/>
+                </a:solidFill>
+                <a:latin typeface="+mn-lt"/>
+                <a:ea typeface="+mn-ea"/>
+                <a:cs typeface="+mn-cs"/>
+              </a:defRPr>
+            </a:lvl9pPr>
+          </a:lstStyle>
+          <a:p>
+            <a:pPr marL="0" indent="0">
+              <a:buFont typeface="Arial" panose="020B0604020202020204" pitchFamily="34" charset="0"/>
+              <a:buNone/>
+            </a:pPr>
+            <a:endParaRPr lang="en-US" sz="1100" dirty="0">
+              <a:latin typeface="+mn-lt"/>
+            </a:endParaRPr>
+          </a:p>
+          <a:p>
+            <a:pPr marL="0" indent="0">
+              <a:buFont typeface="Arial" panose="020B0604020202020204" pitchFamily="34" charset="0"/>
+              <a:buNone/>
+            </a:pPr>
+            <a:endParaRPr lang="en-US" sz="1100" dirty="0">
+              <a:latin typeface="+mn-lt"/>
+            </a:endParaRPr>
           </a:p>
         </p:txBody>
       </p:sp>
@@ -9048,7 +9737,7 @@
           <p:cNvPr id="5" name="Title 2">
             <a:extLst>
               <a:ext uri="{FF2B5EF4-FFF2-40B4-BE49-F238E27FC236}">
-                <a16:creationId xmlns:a16="http://schemas.microsoft.com/office/drawing/2014/main" id="{2AEFDFD8-CEE9-41D2-9F89-54296340D420}"/>
+                <a16:creationId xmlns:a16="http://schemas.microsoft.com/office/drawing/2014/main" id="{C7B3E1ED-D462-4459-B5B0-03807F84ABE3}"/>
               </a:ext>
             </a:extLst>
           </p:cNvPr>
@@ -9078,10 +9767,445 @@
           </a:p>
         </p:txBody>
       </p:sp>
+      <p:pic>
+        <p:nvPicPr>
+          <p:cNvPr id="4" name="Picture 3" descr="Text&#10;&#10;Description automatically generated">
+            <a:extLst>
+              <a:ext uri="{FF2B5EF4-FFF2-40B4-BE49-F238E27FC236}">
+                <a16:creationId xmlns:a16="http://schemas.microsoft.com/office/drawing/2014/main" id="{DA764B60-903E-476E-B56D-AC31A1DD280E}"/>
+              </a:ext>
+            </a:extLst>
+          </p:cNvPr>
+          <p:cNvPicPr>
+            <a:picLocks noChangeAspect="1"/>
+          </p:cNvPicPr>
+          <p:nvPr/>
+        </p:nvPicPr>
+        <p:blipFill rotWithShape="1">
+          <a:blip r:embed="rId2"/>
+          <a:srcRect l="18881" t="15063" r="19004" b="14892"/>
+          <a:stretch/>
+        </p:blipFill>
+        <p:spPr>
+          <a:xfrm>
+            <a:off x="597556" y="1524001"/>
+            <a:ext cx="894914" cy="1009159"/>
+          </a:xfrm>
+          <a:prstGeom prst="rect">
+            <a:avLst/>
+          </a:prstGeom>
+        </p:spPr>
+      </p:pic>
+      <p:sp>
+        <p:nvSpPr>
+          <p:cNvPr id="6" name="TextBox 5">
+            <a:extLst>
+              <a:ext uri="{FF2B5EF4-FFF2-40B4-BE49-F238E27FC236}">
+                <a16:creationId xmlns:a16="http://schemas.microsoft.com/office/drawing/2014/main" id="{5A03712A-621C-4C7D-B2BF-63121A91D93D}"/>
+              </a:ext>
+            </a:extLst>
+          </p:cNvPr>
+          <p:cNvSpPr txBox="1"/>
+          <p:nvPr/>
+        </p:nvSpPr>
+        <p:spPr>
+          <a:xfrm>
+            <a:off x="1752599" y="1524001"/>
+            <a:ext cx="7162800" cy="1056700"/>
+          </a:xfrm>
+          <a:prstGeom prst="rect">
+            <a:avLst/>
+          </a:prstGeom>
+          <a:noFill/>
+        </p:spPr>
+        <p:txBody>
+          <a:bodyPr wrap="square" numCol="2" rtlCol="0">
+            <a:spAutoFit/>
+          </a:bodyPr>
+          <a:lstStyle/>
+          <a:p>
+            <a:pPr marL="285750" indent="-285750">
+              <a:spcAft>
+                <a:spcPts val="400"/>
+              </a:spcAft>
+              <a:buFont typeface="Wingdings" pitchFamily="2" charset="2"/>
+              <a:buChar char="§"/>
+            </a:pPr>
+            <a:r>
+              <a:rPr lang="en-US" sz="1300" dirty="0">
+                <a:solidFill>
+                  <a:srgbClr val="FF0000"/>
+                </a:solidFill>
+                <a:latin typeface="+mn-lt"/>
+              </a:rPr>
+              <a:t>Unemployment Rate</a:t>
+            </a:r>
+          </a:p>
+          <a:p>
+            <a:pPr marL="285750" indent="-285750">
+              <a:spcAft>
+                <a:spcPts val="400"/>
+              </a:spcAft>
+              <a:buFont typeface="Wingdings" pitchFamily="2" charset="2"/>
+              <a:buChar char="§"/>
+            </a:pPr>
+            <a:r>
+              <a:rPr lang="en-US" sz="1300" dirty="0">
+                <a:solidFill>
+                  <a:srgbClr val="FF0000"/>
+                </a:solidFill>
+                <a:latin typeface="+mn-lt"/>
+              </a:rPr>
+              <a:t>Race (African American, American Indian, Asian, White)</a:t>
+            </a:r>
+          </a:p>
+          <a:p>
+            <a:pPr marL="285750" indent="-285750">
+              <a:spcAft>
+                <a:spcPts val="400"/>
+              </a:spcAft>
+              <a:buFont typeface="Wingdings" pitchFamily="2" charset="2"/>
+              <a:buChar char="§"/>
+            </a:pPr>
+            <a:r>
+              <a:rPr lang="en-US" sz="1300" dirty="0">
+                <a:solidFill>
+                  <a:srgbClr val="FF0000"/>
+                </a:solidFill>
+                <a:latin typeface="+mn-lt"/>
+              </a:rPr>
+              <a:t>Median Household Income</a:t>
+            </a:r>
+          </a:p>
+          <a:p>
+            <a:pPr marL="285750" indent="-285750">
+              <a:spcAft>
+                <a:spcPts val="400"/>
+              </a:spcAft>
+              <a:buFont typeface="Wingdings" pitchFamily="2" charset="2"/>
+              <a:buChar char="§"/>
+            </a:pPr>
+            <a:r>
+              <a:rPr lang="en-US" sz="1300" dirty="0">
+                <a:solidFill>
+                  <a:srgbClr val="FF0000"/>
+                </a:solidFill>
+                <a:latin typeface="+mn-lt"/>
+              </a:rPr>
+              <a:t>Poverty Estimators</a:t>
+            </a:r>
+          </a:p>
+          <a:p>
+            <a:pPr marL="285750" indent="-285750">
+              <a:spcAft>
+                <a:spcPts val="400"/>
+              </a:spcAft>
+              <a:buFont typeface="Wingdings" pitchFamily="2" charset="2"/>
+              <a:buChar char="§"/>
+            </a:pPr>
+            <a:r>
+              <a:rPr lang="en-US" sz="1300" dirty="0">
+                <a:solidFill>
+                  <a:srgbClr val="FF0000"/>
+                </a:solidFill>
+                <a:latin typeface="+mn-lt"/>
+              </a:rPr>
+              <a:t>Educational Attainments (Diploma, Bachelor, Masters, PhD.)</a:t>
+            </a:r>
+          </a:p>
+          <a:p>
+            <a:pPr marL="285750" indent="-285750">
+              <a:spcAft>
+                <a:spcPts val="400"/>
+              </a:spcAft>
+              <a:buFont typeface="Wingdings" pitchFamily="2" charset="2"/>
+              <a:buChar char="§"/>
+            </a:pPr>
+            <a:r>
+              <a:rPr lang="en-US" sz="1300" dirty="0">
+                <a:solidFill>
+                  <a:srgbClr val="FF0000"/>
+                </a:solidFill>
+                <a:latin typeface="+mn-lt"/>
+              </a:rPr>
+              <a:t>Migration Rates</a:t>
+            </a:r>
+          </a:p>
+        </p:txBody>
+      </p:sp>
+      <p:sp>
+        <p:nvSpPr>
+          <p:cNvPr id="9" name="TextBox 8">
+            <a:extLst>
+              <a:ext uri="{FF2B5EF4-FFF2-40B4-BE49-F238E27FC236}">
+                <a16:creationId xmlns:a16="http://schemas.microsoft.com/office/drawing/2014/main" id="{A982735A-D940-4B8C-B1B1-61052106992D}"/>
+              </a:ext>
+            </a:extLst>
+          </p:cNvPr>
+          <p:cNvSpPr txBox="1"/>
+          <p:nvPr/>
+        </p:nvSpPr>
+        <p:spPr>
+          <a:xfrm>
+            <a:off x="5125617" y="3162845"/>
+            <a:ext cx="3785117" cy="2513509"/>
+          </a:xfrm>
+          <a:prstGeom prst="rect">
+            <a:avLst/>
+          </a:prstGeom>
+          <a:noFill/>
+        </p:spPr>
+        <p:txBody>
+          <a:bodyPr wrap="square" numCol="1" rtlCol="0">
+            <a:spAutoFit/>
+          </a:bodyPr>
+          <a:lstStyle/>
+          <a:p>
+            <a:pPr marL="285750" indent="-285750">
+              <a:spcAft>
+                <a:spcPts val="400"/>
+              </a:spcAft>
+              <a:buFont typeface="Wingdings" pitchFamily="2" charset="2"/>
+              <a:buChar char="Ø"/>
+            </a:pPr>
+            <a:r>
+              <a:rPr lang="en-US" sz="1200" dirty="0">
+                <a:solidFill>
+                  <a:srgbClr val="FF0000"/>
+                </a:solidFill>
+                <a:latin typeface="+mn-lt"/>
+              </a:rPr>
+              <a:t>For every percentage of increase in African American population, 0.8 percent of democratic votes should increase</a:t>
+            </a:r>
+            <a:br>
+              <a:rPr lang="en-US" sz="1200" dirty="0">
+                <a:latin typeface="+mn-lt"/>
+              </a:rPr>
+            </a:br>
+            <a:endParaRPr lang="en-US" sz="1200" dirty="0">
+              <a:latin typeface="+mn-lt"/>
+            </a:endParaRPr>
+          </a:p>
+          <a:p>
+            <a:pPr marL="285750" indent="-285750">
+              <a:spcAft>
+                <a:spcPts val="400"/>
+              </a:spcAft>
+              <a:buFont typeface="Wingdings" pitchFamily="2" charset="2"/>
+              <a:buChar char="Ø"/>
+            </a:pPr>
+            <a:endParaRPr lang="en-US" sz="1200" dirty="0">
+              <a:latin typeface="+mn-lt"/>
+            </a:endParaRPr>
+          </a:p>
+          <a:p>
+            <a:pPr marL="285750" indent="-285750">
+              <a:spcAft>
+                <a:spcPts val="400"/>
+              </a:spcAft>
+              <a:buFont typeface="Wingdings" pitchFamily="2" charset="2"/>
+              <a:buChar char="Ø"/>
+            </a:pPr>
+            <a:r>
+              <a:rPr lang="en-US" sz="1200" dirty="0">
+                <a:solidFill>
+                  <a:srgbClr val="FF0000"/>
+                </a:solidFill>
+                <a:latin typeface="+mn-lt"/>
+              </a:rPr>
+              <a:t>For every percentage of decrease in unemployment rate, 0.02 percent of democratic should increase.</a:t>
+            </a:r>
+            <a:br>
+              <a:rPr lang="en-US" sz="1200" dirty="0">
+                <a:solidFill>
+                  <a:srgbClr val="FF0000"/>
+                </a:solidFill>
+                <a:latin typeface="+mn-lt"/>
+              </a:rPr>
+            </a:br>
+            <a:endParaRPr lang="en-US" sz="1200" dirty="0">
+              <a:solidFill>
+                <a:srgbClr val="FF0000"/>
+              </a:solidFill>
+              <a:latin typeface="+mn-lt"/>
+            </a:endParaRPr>
+          </a:p>
+          <a:p>
+            <a:pPr>
+              <a:spcAft>
+                <a:spcPts val="400"/>
+              </a:spcAft>
+            </a:pPr>
+            <a:endParaRPr lang="en-US" sz="1200" dirty="0">
+              <a:solidFill>
+                <a:srgbClr val="FF0000"/>
+              </a:solidFill>
+              <a:latin typeface="+mn-lt"/>
+            </a:endParaRPr>
+          </a:p>
+          <a:p>
+            <a:pPr marL="285750" indent="-285750">
+              <a:spcAft>
+                <a:spcPts val="400"/>
+              </a:spcAft>
+              <a:buFont typeface="Wingdings" pitchFamily="2" charset="2"/>
+              <a:buChar char="Ø"/>
+            </a:pPr>
+            <a:r>
+              <a:rPr lang="en-US" sz="1200" dirty="0">
+                <a:solidFill>
+                  <a:srgbClr val="FF0000"/>
+                </a:solidFill>
+                <a:latin typeface="+mn-lt"/>
+              </a:rPr>
+              <a:t>For educational attainment increase in the country, around 0.05 percent increase should be in democrat votes</a:t>
+            </a:r>
+          </a:p>
+        </p:txBody>
+      </p:sp>
+      <p:sp>
+        <p:nvSpPr>
+          <p:cNvPr id="10" name="TextBox 9">
+            <a:extLst>
+              <a:ext uri="{FF2B5EF4-FFF2-40B4-BE49-F238E27FC236}">
+                <a16:creationId xmlns:a16="http://schemas.microsoft.com/office/drawing/2014/main" id="{FB1F0A7D-5430-4D04-9496-1C27B940D7CB}"/>
+              </a:ext>
+            </a:extLst>
+          </p:cNvPr>
+          <p:cNvSpPr txBox="1"/>
+          <p:nvPr/>
+        </p:nvSpPr>
+        <p:spPr>
+          <a:xfrm>
+            <a:off x="2089281" y="6060388"/>
+            <a:ext cx="5334000" cy="400110"/>
+          </a:xfrm>
+          <a:prstGeom prst="rect">
+            <a:avLst/>
+          </a:prstGeom>
+          <a:noFill/>
+        </p:spPr>
+        <p:txBody>
+          <a:bodyPr wrap="square" rtlCol="0">
+            <a:spAutoFit/>
+          </a:bodyPr>
+          <a:lstStyle/>
+          <a:p>
+            <a:r>
+              <a:rPr lang="en-US" sz="2000" b="1" dirty="0">
+                <a:solidFill>
+                  <a:srgbClr val="C1202F"/>
+                </a:solidFill>
+              </a:rPr>
+              <a:t>Test RMSE: 0.08     	      Test MAPE: 68%</a:t>
+            </a:r>
+          </a:p>
+        </p:txBody>
+      </p:sp>
+      <p:pic>
+        <p:nvPicPr>
+          <p:cNvPr id="3" name="Picture 2" descr="Icon&#10;&#10;Description automatically generated">
+            <a:extLst>
+              <a:ext uri="{FF2B5EF4-FFF2-40B4-BE49-F238E27FC236}">
+                <a16:creationId xmlns:a16="http://schemas.microsoft.com/office/drawing/2014/main" id="{450DD9BB-B42A-4AA7-8685-1D575B9F4788}"/>
+              </a:ext>
+            </a:extLst>
+          </p:cNvPr>
+          <p:cNvPicPr>
+            <a:picLocks noChangeAspect="1"/>
+          </p:cNvPicPr>
+          <p:nvPr/>
+        </p:nvPicPr>
+        <p:blipFill>
+          <a:blip r:embed="rId3">
+            <a:extLst>
+              <a:ext uri="{BEBA8EAE-BF5A-486C-A8C5-ECC9F3942E4B}">
+                <a14:imgProps xmlns:a14="http://schemas.microsoft.com/office/drawing/2010/main">
+                  <a14:imgLayer r:embed="rId4">
+                    <a14:imgEffect>
+                      <a14:backgroundRemoval t="5290" b="91598" l="6628" r="94070">
+                        <a14:foregroundMark x1="6628" y1="19813" x2="8837" y2="25622"/>
+                        <a14:foregroundMark x1="28837" y1="14212" x2="54186" y2="40560"/>
+                        <a14:foregroundMark x1="54186" y1="40560" x2="54186" y2="40249"/>
+                        <a14:foregroundMark x1="51628" y1="19295" x2="73837" y2="8714"/>
+                        <a14:foregroundMark x1="94070" y1="14834" x2="93488" y2="21577"/>
+                        <a14:foregroundMark x1="42558" y1="91701" x2="50698" y2="91701"/>
+                        <a14:foregroundMark x1="21628" y1="5290" x2="23837" y2="5290"/>
+                      </a14:backgroundRemoval>
+                    </a14:imgEffect>
+                  </a14:imgLayer>
+                </a14:imgProps>
+              </a:ext>
+            </a:extLst>
+          </a:blip>
+          <a:stretch>
+            <a:fillRect/>
+          </a:stretch>
+        </p:blipFill>
+        <p:spPr>
+          <a:xfrm>
+            <a:off x="1492470" y="5968857"/>
+            <a:ext cx="520257" cy="583172"/>
+          </a:xfrm>
+          <a:prstGeom prst="rect">
+            <a:avLst/>
+          </a:prstGeom>
+        </p:spPr>
+      </p:pic>
+      <p:pic>
+        <p:nvPicPr>
+          <p:cNvPr id="11" name="Picture 10" descr="Icon&#10;&#10;Description automatically generated">
+            <a:extLst>
+              <a:ext uri="{FF2B5EF4-FFF2-40B4-BE49-F238E27FC236}">
+                <a16:creationId xmlns:a16="http://schemas.microsoft.com/office/drawing/2014/main" id="{6A28C97D-AF2A-4505-8C79-3A469418DDE9}"/>
+              </a:ext>
+            </a:extLst>
+          </p:cNvPr>
+          <p:cNvPicPr>
+            <a:picLocks noChangeAspect="1"/>
+          </p:cNvPicPr>
+          <p:nvPr/>
+        </p:nvPicPr>
+        <p:blipFill>
+          <a:blip r:embed="rId3">
+            <a:extLst>
+              <a:ext uri="{BEBA8EAE-BF5A-486C-A8C5-ECC9F3942E4B}">
+                <a14:imgProps xmlns:a14="http://schemas.microsoft.com/office/drawing/2010/main">
+                  <a14:imgLayer r:embed="rId4">
+                    <a14:imgEffect>
+                      <a14:backgroundRemoval t="5290" b="91598" l="6628" r="94070">
+                        <a14:foregroundMark x1="6628" y1="19813" x2="8837" y2="25622"/>
+                        <a14:foregroundMark x1="28837" y1="14212" x2="54186" y2="40560"/>
+                        <a14:foregroundMark x1="54186" y1="40560" x2="54186" y2="40249"/>
+                        <a14:foregroundMark x1="51628" y1="19295" x2="73837" y2="8714"/>
+                        <a14:foregroundMark x1="94070" y1="14834" x2="93488" y2="21577"/>
+                        <a14:foregroundMark x1="42558" y1="91701" x2="50698" y2="91701"/>
+                        <a14:foregroundMark x1="21628" y1="5290" x2="23837" y2="5290"/>
+                      </a14:backgroundRemoval>
+                    </a14:imgEffect>
+                  </a14:imgLayer>
+                </a14:imgProps>
+              </a:ext>
+            </a:extLst>
+          </a:blip>
+          <a:stretch>
+            <a:fillRect/>
+          </a:stretch>
+        </p:blipFill>
+        <p:spPr>
+          <a:xfrm>
+            <a:off x="7423281" y="5968857"/>
+            <a:ext cx="520257" cy="583172"/>
+          </a:xfrm>
+          <a:prstGeom prst="rect">
+            <a:avLst/>
+          </a:prstGeom>
+        </p:spPr>
+      </p:pic>
     </p:spTree>
     <p:extLst>
       <p:ext uri="{BB962C8B-B14F-4D97-AF65-F5344CB8AC3E}">
-        <p14:creationId xmlns:p14="http://schemas.microsoft.com/office/powerpoint/2010/main" val="1433147583"/>
+        <p14:creationId xmlns:p14="http://schemas.microsoft.com/office/powerpoint/2010/main" val="468046518"/>
       </p:ext>
     </p:extLst>
   </p:cSld>
@@ -9222,7 +10346,7 @@
         </p:nvSpPr>
         <p:spPr>
           <a:xfrm>
-            <a:off x="1905000" y="1828800"/>
+            <a:off x="1905000" y="1905000"/>
             <a:ext cx="6781800" cy="830997"/>
           </a:xfrm>
           <a:prstGeom prst="rect">
@@ -9259,7 +10383,7 @@
         </p:nvSpPr>
         <p:spPr>
           <a:xfrm>
-            <a:off x="1877008" y="3040797"/>
+            <a:off x="1877008" y="3443406"/>
             <a:ext cx="6781800" cy="830997"/>
           </a:xfrm>
           <a:prstGeom prst="rect">
@@ -9277,7 +10401,7 @@
               <a:rPr lang="en-US" sz="1600" dirty="0">
                 <a:latin typeface="+mn-lt"/>
               </a:rPr>
-              <a:t>The dependent variable did not have linear relationship with some independent variables. A non-linear tree-based regression model like Random Forest or Gradient Boosting might work better.</a:t>
+              <a:t>The dependent variable didn’t have linear relationship with some independent variables. Further exploration and feature engineering, like creating composite variables and variable transformation would improve the model.</a:t>
             </a:r>
           </a:p>
         </p:txBody>
@@ -9296,7 +10420,7 @@
         </p:nvSpPr>
         <p:spPr>
           <a:xfrm>
-            <a:off x="1877008" y="4252794"/>
+            <a:off x="1877008" y="5036403"/>
             <a:ext cx="6781800" cy="830997"/>
           </a:xfrm>
           <a:prstGeom prst="rect">
@@ -9319,6 +10443,118 @@
           </a:p>
         </p:txBody>
       </p:sp>
+      <p:pic>
+        <p:nvPicPr>
+          <p:cNvPr id="11" name="Picture 10" descr="Icon&#10;&#10;Description automatically generated">
+            <a:extLst>
+              <a:ext uri="{FF2B5EF4-FFF2-40B4-BE49-F238E27FC236}">
+                <a16:creationId xmlns:a16="http://schemas.microsoft.com/office/drawing/2014/main" id="{CBC781B2-F747-472D-BB73-2B4C03C11FDE}"/>
+              </a:ext>
+            </a:extLst>
+          </p:cNvPr>
+          <p:cNvPicPr>
+            <a:picLocks noChangeAspect="1"/>
+          </p:cNvPicPr>
+          <p:nvPr/>
+        </p:nvPicPr>
+        <p:blipFill>
+          <a:blip r:embed="rId2">
+            <a:extLst>
+              <a:ext uri="{BEBA8EAE-BF5A-486C-A8C5-ECC9F3942E4B}">
+                <a14:imgProps xmlns:a14="http://schemas.microsoft.com/office/drawing/2010/main">
+                  <a14:imgLayer r:embed="rId3">
+                    <a14:imgEffect>
+                      <a14:backgroundRemoval t="4231" b="96026" l="5000" r="93778">
+                        <a14:foregroundMark x1="9333" y1="57821" x2="10333" y2="74359"/>
+                        <a14:foregroundMark x1="10333" y1="74359" x2="10333" y2="74359"/>
+                        <a14:foregroundMark x1="5222" y1="76538" x2="13333" y2="88846"/>
+                        <a14:foregroundMark x1="13333" y1="88846" x2="13333" y2="88846"/>
+                        <a14:foregroundMark x1="19556" y1="92692" x2="23333" y2="94615"/>
+                        <a14:foregroundMark x1="33667" y1="22949" x2="48556" y2="8590"/>
+                        <a14:foregroundMark x1="53000" y1="4231" x2="55444" y2="7308"/>
+                        <a14:foregroundMark x1="93778" y1="47821" x2="89111" y2="44615"/>
+                        <a14:foregroundMark x1="70333" y1="96026" x2="77222" y2="95000"/>
+                      </a14:backgroundRemoval>
+                    </a14:imgEffect>
+                  </a14:imgLayer>
+                </a14:imgProps>
+              </a:ext>
+            </a:extLst>
+          </a:blip>
+          <a:stretch>
+            <a:fillRect/>
+          </a:stretch>
+        </p:blipFill>
+        <p:spPr>
+          <a:xfrm>
+            <a:off x="762000" y="1851270"/>
+            <a:ext cx="990600" cy="858520"/>
+          </a:xfrm>
+          <a:prstGeom prst="rect">
+            <a:avLst/>
+          </a:prstGeom>
+        </p:spPr>
+      </p:pic>
+      <p:pic>
+        <p:nvPicPr>
+          <p:cNvPr id="13" name="Picture 12" descr="Icon&#10;&#10;Description automatically generated">
+            <a:extLst>
+              <a:ext uri="{FF2B5EF4-FFF2-40B4-BE49-F238E27FC236}">
+                <a16:creationId xmlns:a16="http://schemas.microsoft.com/office/drawing/2014/main" id="{3DEDCD9C-D3F4-4A2E-B94C-3BDC5BD819E2}"/>
+              </a:ext>
+            </a:extLst>
+          </p:cNvPr>
+          <p:cNvPicPr>
+            <a:picLocks noChangeAspect="1"/>
+          </p:cNvPicPr>
+          <p:nvPr/>
+        </p:nvPicPr>
+        <p:blipFill>
+          <a:blip r:embed="rId4"/>
+          <a:stretch>
+            <a:fillRect/>
+          </a:stretch>
+        </p:blipFill>
+        <p:spPr>
+          <a:xfrm>
+            <a:off x="762000" y="3294689"/>
+            <a:ext cx="990600" cy="990600"/>
+          </a:xfrm>
+          <a:prstGeom prst="rect">
+            <a:avLst/>
+          </a:prstGeom>
+        </p:spPr>
+      </p:pic>
+      <p:pic>
+        <p:nvPicPr>
+          <p:cNvPr id="15" name="Picture 14" descr="Shape&#10;&#10;Description automatically generated with low confidence">
+            <a:extLst>
+              <a:ext uri="{FF2B5EF4-FFF2-40B4-BE49-F238E27FC236}">
+                <a16:creationId xmlns:a16="http://schemas.microsoft.com/office/drawing/2014/main" id="{456C2C4A-A00C-46FC-B038-D469918DE7E8}"/>
+              </a:ext>
+            </a:extLst>
+          </p:cNvPr>
+          <p:cNvPicPr>
+            <a:picLocks noChangeAspect="1"/>
+          </p:cNvPicPr>
+          <p:nvPr/>
+        </p:nvPicPr>
+        <p:blipFill>
+          <a:blip r:embed="rId5"/>
+          <a:stretch>
+            <a:fillRect/>
+          </a:stretch>
+        </p:blipFill>
+        <p:spPr>
+          <a:xfrm>
+            <a:off x="723081" y="4870188"/>
+            <a:ext cx="1070396" cy="1070396"/>
+          </a:xfrm>
+          <a:prstGeom prst="rect">
+            <a:avLst/>
+          </a:prstGeom>
+        </p:spPr>
+      </p:pic>
     </p:spTree>
     <p:extLst>
       <p:ext uri="{BB962C8B-B14F-4D97-AF65-F5344CB8AC3E}">
@@ -9822,8 +11058,8 @@
         </p:blipFill>
         <p:spPr>
           <a:xfrm>
-            <a:off x="723900" y="1666467"/>
-            <a:ext cx="647700" cy="390933"/>
+            <a:off x="454944" y="1656533"/>
+            <a:ext cx="916656" cy="553267"/>
           </a:xfrm>
           <a:prstGeom prst="rect">
             <a:avLst/>
@@ -9864,8 +11100,8 @@
         </p:blipFill>
         <p:spPr>
           <a:xfrm>
-            <a:off x="723900" y="2504667"/>
-            <a:ext cx="647700" cy="390933"/>
+            <a:off x="471403" y="2580867"/>
+            <a:ext cx="900197" cy="543333"/>
           </a:xfrm>
           <a:prstGeom prst="rect">
             <a:avLst/>
@@ -12844,11 +14080,110 @@
           <a:p>
             <a:r>
               <a:rPr lang="en-US" dirty="0"/>
-              <a:t>Exploratory Data Analysis Plot 1</a:t>
+              <a:t>Exploratory Data Analysis</a:t>
             </a:r>
           </a:p>
         </p:txBody>
       </p:sp>
+      <p:sp>
+        <p:nvSpPr>
+          <p:cNvPr id="3" name="TextBox 2">
+            <a:extLst>
+              <a:ext uri="{FF2B5EF4-FFF2-40B4-BE49-F238E27FC236}">
+                <a16:creationId xmlns:a16="http://schemas.microsoft.com/office/drawing/2014/main" id="{453D179F-AB5C-44ED-A6F0-41D9741C1505}"/>
+              </a:ext>
+            </a:extLst>
+          </p:cNvPr>
+          <p:cNvSpPr txBox="1"/>
+          <p:nvPr/>
+        </p:nvSpPr>
+        <p:spPr>
+          <a:xfrm>
+            <a:off x="685800" y="1752600"/>
+            <a:ext cx="7848600" cy="769441"/>
+          </a:xfrm>
+          <a:prstGeom prst="rect">
+            <a:avLst/>
+          </a:prstGeom>
+          <a:noFill/>
+        </p:spPr>
+        <p:txBody>
+          <a:bodyPr wrap="square" rtlCol="0">
+            <a:spAutoFit/>
+          </a:bodyPr>
+          <a:lstStyle/>
+          <a:p>
+            <a:r>
+              <a:rPr lang="en-US" sz="4400" dirty="0">
+                <a:solidFill>
+                  <a:srgbClr val="FF0000"/>
+                </a:solidFill>
+              </a:rPr>
+              <a:t>Lorem Ipsum</a:t>
+            </a:r>
+          </a:p>
+        </p:txBody>
+      </p:sp>
+      <p:pic>
+        <p:nvPicPr>
+          <p:cNvPr id="4" name="Picture 3" descr="Chart, bar chart&#10;&#10;Description automatically generated">
+            <a:extLst>
+              <a:ext uri="{FF2B5EF4-FFF2-40B4-BE49-F238E27FC236}">
+                <a16:creationId xmlns:a16="http://schemas.microsoft.com/office/drawing/2014/main" id="{DFA73F9E-A3C8-4B41-B221-733E00A88E3F}"/>
+              </a:ext>
+            </a:extLst>
+          </p:cNvPr>
+          <p:cNvPicPr>
+            <a:picLocks noChangeAspect="1"/>
+          </p:cNvPicPr>
+          <p:nvPr/>
+        </p:nvPicPr>
+        <p:blipFill>
+          <a:blip r:embed="rId2"/>
+          <a:stretch>
+            <a:fillRect/>
+          </a:stretch>
+        </p:blipFill>
+        <p:spPr>
+          <a:xfrm>
+            <a:off x="665399" y="2667000"/>
+            <a:ext cx="4105770" cy="2867308"/>
+          </a:xfrm>
+          <a:prstGeom prst="rect">
+            <a:avLst/>
+          </a:prstGeom>
+        </p:spPr>
+      </p:pic>
+      <p:pic>
+        <p:nvPicPr>
+          <p:cNvPr id="6" name="Picture 5" descr="Chart, bar chart&#10;&#10;Description automatically generated">
+            <a:extLst>
+              <a:ext uri="{FF2B5EF4-FFF2-40B4-BE49-F238E27FC236}">
+                <a16:creationId xmlns:a16="http://schemas.microsoft.com/office/drawing/2014/main" id="{EC7FE9A3-1C2B-4130-9AAD-63ED42B832FC}"/>
+              </a:ext>
+            </a:extLst>
+          </p:cNvPr>
+          <p:cNvPicPr>
+            <a:picLocks noChangeAspect="1"/>
+          </p:cNvPicPr>
+          <p:nvPr/>
+        </p:nvPicPr>
+        <p:blipFill>
+          <a:blip r:embed="rId3"/>
+          <a:stretch>
+            <a:fillRect/>
+          </a:stretch>
+        </p:blipFill>
+        <p:spPr>
+          <a:xfrm>
+            <a:off x="4771169" y="2667000"/>
+            <a:ext cx="3767896" cy="2867309"/>
+          </a:xfrm>
+          <a:prstGeom prst="rect">
+            <a:avLst/>
+          </a:prstGeom>
+        </p:spPr>
+      </p:pic>
     </p:spTree>
     <p:extLst>
       <p:ext uri="{BB962C8B-B14F-4D97-AF65-F5344CB8AC3E}">
@@ -12909,7 +14244,160 @@
           <a:p>
             <a:r>
               <a:rPr lang="en-US" dirty="0"/>
-              <a:t>Exploratory Data Analysis Plot 2</a:t>
+              <a:t>Exploratory Data Analysis</a:t>
+            </a:r>
+          </a:p>
+        </p:txBody>
+      </p:sp>
+      <p:pic>
+        <p:nvPicPr>
+          <p:cNvPr id="3" name="Picture 2" descr="Chart, scatter chart&#10;&#10;Description automatically generated">
+            <a:extLst>
+              <a:ext uri="{FF2B5EF4-FFF2-40B4-BE49-F238E27FC236}">
+                <a16:creationId xmlns:a16="http://schemas.microsoft.com/office/drawing/2014/main" id="{FF5758B1-2110-483C-B00F-8F62B380531B}"/>
+              </a:ext>
+            </a:extLst>
+          </p:cNvPr>
+          <p:cNvPicPr>
+            <a:picLocks noChangeAspect="1"/>
+          </p:cNvPicPr>
+          <p:nvPr/>
+        </p:nvPicPr>
+        <p:blipFill>
+          <a:blip r:embed="rId2"/>
+          <a:stretch>
+            <a:fillRect/>
+          </a:stretch>
+        </p:blipFill>
+        <p:spPr>
+          <a:xfrm>
+            <a:off x="597616" y="2819400"/>
+            <a:ext cx="3889174" cy="2716046"/>
+          </a:xfrm>
+          <a:prstGeom prst="rect">
+            <a:avLst/>
+          </a:prstGeom>
+        </p:spPr>
+      </p:pic>
+      <p:pic>
+        <p:nvPicPr>
+          <p:cNvPr id="7" name="Picture 6" descr="Chart, scatter chart&#10;&#10;Description automatically generated">
+            <a:extLst>
+              <a:ext uri="{FF2B5EF4-FFF2-40B4-BE49-F238E27FC236}">
+                <a16:creationId xmlns:a16="http://schemas.microsoft.com/office/drawing/2014/main" id="{8ACCC1B5-C69D-4736-BDE8-15EF43B4505F}"/>
+              </a:ext>
+            </a:extLst>
+          </p:cNvPr>
+          <p:cNvPicPr>
+            <a:picLocks noChangeAspect="1"/>
+          </p:cNvPicPr>
+          <p:nvPr/>
+        </p:nvPicPr>
+        <p:blipFill>
+          <a:blip r:embed="rId3"/>
+          <a:stretch>
+            <a:fillRect/>
+          </a:stretch>
+        </p:blipFill>
+        <p:spPr>
+          <a:xfrm>
+            <a:off x="5029200" y="2819400"/>
+            <a:ext cx="3867130" cy="2716046"/>
+          </a:xfrm>
+          <a:prstGeom prst="rect">
+            <a:avLst/>
+          </a:prstGeom>
+        </p:spPr>
+      </p:pic>
+      <p:sp>
+        <p:nvSpPr>
+          <p:cNvPr id="8" name="Isosceles Triangle 7">
+            <a:extLst>
+              <a:ext uri="{FF2B5EF4-FFF2-40B4-BE49-F238E27FC236}">
+                <a16:creationId xmlns:a16="http://schemas.microsoft.com/office/drawing/2014/main" id="{7692993C-514B-440D-B003-0D2479841912}"/>
+              </a:ext>
+            </a:extLst>
+          </p:cNvPr>
+          <p:cNvSpPr/>
+          <p:nvPr/>
+        </p:nvSpPr>
+        <p:spPr>
+          <a:xfrm rot="5400000">
+            <a:off x="3603944" y="4067523"/>
+            <a:ext cx="2277000" cy="345046"/>
+          </a:xfrm>
+          <a:prstGeom prst="triangle">
+            <a:avLst/>
+          </a:prstGeom>
+          <a:solidFill>
+            <a:schemeClr val="tx2">
+              <a:lumMod val="20000"/>
+              <a:lumOff val="80000"/>
+            </a:schemeClr>
+          </a:solidFill>
+          <a:ln>
+            <a:noFill/>
+          </a:ln>
+          <a:effectLst/>
+        </p:spPr>
+        <p:style>
+          <a:lnRef idx="1">
+            <a:schemeClr val="accent1"/>
+          </a:lnRef>
+          <a:fillRef idx="3">
+            <a:schemeClr val="accent1"/>
+          </a:fillRef>
+          <a:effectRef idx="2">
+            <a:schemeClr val="accent1"/>
+          </a:effectRef>
+          <a:fontRef idx="minor">
+            <a:schemeClr val="lt1"/>
+          </a:fontRef>
+        </p:style>
+        <p:txBody>
+          <a:bodyPr rtlCol="0" anchor="ctr"/>
+          <a:lstStyle/>
+          <a:p>
+            <a:pPr algn="ctr"/>
+            <a:endParaRPr lang="en-US"/>
+          </a:p>
+        </p:txBody>
+      </p:sp>
+      <p:sp>
+        <p:nvSpPr>
+          <p:cNvPr id="9" name="TextBox 8">
+            <a:extLst>
+              <a:ext uri="{FF2B5EF4-FFF2-40B4-BE49-F238E27FC236}">
+                <a16:creationId xmlns:a16="http://schemas.microsoft.com/office/drawing/2014/main" id="{4EB6B96B-1484-4DF1-A51B-08920DCA174E}"/>
+              </a:ext>
+            </a:extLst>
+          </p:cNvPr>
+          <p:cNvSpPr txBox="1"/>
+          <p:nvPr/>
+        </p:nvSpPr>
+        <p:spPr>
+          <a:xfrm>
+            <a:off x="685800" y="1752600"/>
+            <a:ext cx="7848600" cy="707886"/>
+          </a:xfrm>
+          <a:prstGeom prst="rect">
+            <a:avLst/>
+          </a:prstGeom>
+          <a:noFill/>
+        </p:spPr>
+        <p:txBody>
+          <a:bodyPr wrap="square" rtlCol="0">
+            <a:spAutoFit/>
+          </a:bodyPr>
+          <a:lstStyle/>
+          <a:p>
+            <a:r>
+              <a:rPr lang="en-US" sz="4000" dirty="0">
+                <a:solidFill>
+                  <a:srgbClr val="FF0000"/>
+                </a:solidFill>
+              </a:rPr>
+              <a:t>Lorem Ipsum</a:t>
             </a:r>
           </a:p>
         </p:txBody>

</xml_diff>

<commit_message>
Final PowerPoint Presentation => Updated
</commit_message>
<xml_diff>
--- a/Final Submission/Presidential Election Analysis_Final.pptx
+++ b/Final Submission/Presidential Election Analysis_Final.pptx
@@ -3620,7 +3620,7 @@
           <a:p>
             <a:fld id="{7BEA590F-A513-42B1-89D4-B7C08C22AC93}" type="datetimeFigureOut">
               <a:rPr lang="en-US" smtClean="0"/>
-              <a:t>3/29/2022</a:t>
+              <a:t>3/29/22</a:t>
             </a:fld>
             <a:endParaRPr lang="en-US"/>
           </a:p>
@@ -3932,14 +3932,14 @@
           </a:ln>
           <a:extLst>
             <a:ext uri="{909E8E84-426E-40dd-AFC4-6F175D3DCCD1}">
-              <a14:hiddenFill xmlns="" xmlns:a14="http://schemas.microsoft.com/office/drawing/2010/main">
+              <a14:hiddenFill xmlns:a14="http://schemas.microsoft.com/office/drawing/2010/main" xmlns="">
                 <a:solidFill>
                   <a:srgbClr val="FFFFFF"/>
                 </a:solidFill>
               </a14:hiddenFill>
             </a:ext>
             <a:ext uri="{91240B29-F687-4f45-9708-019B960494DF}">
-              <a14:hiddenLine xmlns="" xmlns:a14="http://schemas.microsoft.com/office/drawing/2010/main" w="9525">
+              <a14:hiddenLine xmlns:a14="http://schemas.microsoft.com/office/drawing/2010/main" xmlns="" w="9525">
                 <a:solidFill>
                   <a:srgbClr val="000000"/>
                 </a:solidFill>
@@ -4157,14 +4157,14 @@
           </a:ln>
           <a:extLst>
             <a:ext uri="{909E8E84-426E-40dd-AFC4-6F175D3DCCD1}">
-              <a14:hiddenFill xmlns="" xmlns:a14="http://schemas.microsoft.com/office/drawing/2010/main">
+              <a14:hiddenFill xmlns:a14="http://schemas.microsoft.com/office/drawing/2010/main" xmlns="">
                 <a:solidFill>
                   <a:srgbClr val="FFFFFF"/>
                 </a:solidFill>
               </a14:hiddenFill>
             </a:ext>
             <a:ext uri="{91240B29-F687-4f45-9708-019B960494DF}">
-              <a14:hiddenLine xmlns="" xmlns:a14="http://schemas.microsoft.com/office/drawing/2010/main" w="9525">
+              <a14:hiddenLine xmlns:a14="http://schemas.microsoft.com/office/drawing/2010/main" xmlns="" w="9525">
                 <a:solidFill>
                   <a:srgbClr val="000000"/>
                 </a:solidFill>
@@ -4328,7 +4328,7 @@
             <a:fld id="{1210D201-B81E-470F-A152-87DB35E113A8}" type="datetimeFigureOut">
               <a:rPr lang="en-US" altLang="en-US"/>
               <a:pPr/>
-              <a:t>3/29/2022</a:t>
+              <a:t>3/29/22</a:t>
             </a:fld>
             <a:endParaRPr lang="en-US" altLang="en-US"/>
           </a:p>
@@ -4692,7 +4692,7 @@
             <a:fld id="{065B2143-4885-47E3-A9EB-607A302E185E}" type="datetimeFigureOut">
               <a:rPr lang="en-US" altLang="en-US"/>
               <a:pPr/>
-              <a:t>3/29/2022</a:t>
+              <a:t>3/29/22</a:t>
             </a:fld>
             <a:endParaRPr lang="en-US" altLang="en-US"/>
           </a:p>
@@ -4975,7 +4975,7 @@
             <a:fld id="{FE7ACBF5-1757-4FA1-8770-7D42E8AB3403}" type="datetimeFigureOut">
               <a:rPr lang="en-US" altLang="en-US"/>
               <a:pPr/>
-              <a:t>3/29/2022</a:t>
+              <a:t>3/29/22</a:t>
             </a:fld>
             <a:endParaRPr lang="en-US" altLang="en-US"/>
           </a:p>
@@ -5306,7 +5306,7 @@
             <a:fld id="{31EC4CDC-1D50-43D9-92DD-EC1F6918FC5E}" type="datetimeFigureOut">
               <a:rPr lang="en-US" altLang="en-US"/>
               <a:pPr/>
-              <a:t>3/29/2022</a:t>
+              <a:t>3/29/22</a:t>
             </a:fld>
             <a:endParaRPr lang="en-US" altLang="en-US"/>
           </a:p>
@@ -5768,7 +5768,7 @@
             <a:fld id="{B29945B5-1676-4A4A-9769-87262D092169}" type="datetimeFigureOut">
               <a:rPr lang="en-US" altLang="en-US"/>
               <a:pPr/>
-              <a:t>3/29/2022</a:t>
+              <a:t>3/29/22</a:t>
             </a:fld>
             <a:endParaRPr lang="en-US" altLang="en-US"/>
           </a:p>
@@ -5934,7 +5934,7 @@
             <a:fld id="{15EA8BE1-029F-4049-94C0-3048ABCECBF1}" type="datetimeFigureOut">
               <a:rPr lang="en-US" altLang="en-US"/>
               <a:pPr/>
-              <a:t>3/29/2022</a:t>
+              <a:t>3/29/22</a:t>
             </a:fld>
             <a:endParaRPr lang="en-US" altLang="en-US"/>
           </a:p>
@@ -6064,7 +6064,7 @@
             <a:fld id="{AE94213C-83F6-4CB9-84A6-5E06AF59783F}" type="datetimeFigureOut">
               <a:rPr lang="en-US" altLang="en-US"/>
               <a:pPr/>
-              <a:t>3/29/2022</a:t>
+              <a:t>3/29/22</a:t>
             </a:fld>
             <a:endParaRPr lang="en-US" altLang="en-US"/>
           </a:p>
@@ -6377,7 +6377,7 @@
             <a:fld id="{923DF63F-B3A0-44E6-BDF4-2B9B8EC924BB}" type="datetimeFigureOut">
               <a:rPr lang="en-US" altLang="en-US"/>
               <a:pPr/>
-              <a:t>3/29/2022</a:t>
+              <a:t>3/29/22</a:t>
             </a:fld>
             <a:endParaRPr lang="en-US" altLang="en-US"/>
           </a:p>
@@ -6673,7 +6673,7 @@
             <a:fld id="{B151E1F3-2510-46B4-B4CA-F46EB747AB32}" type="datetimeFigureOut">
               <a:rPr lang="en-US" altLang="en-US"/>
               <a:pPr/>
-              <a:t>3/29/2022</a:t>
+              <a:t>3/29/22</a:t>
             </a:fld>
             <a:endParaRPr lang="en-US" altLang="en-US"/>
           </a:p>
@@ -6920,7 +6920,7 @@
             <a:fld id="{C11C1CF1-2F3A-4423-90F7-0EB150F19318}" type="datetimeFigureOut">
               <a:rPr lang="en-US" altLang="en-US"/>
               <a:pPr/>
-              <a:t>3/29/2022</a:t>
+              <a:t>3/29/22</a:t>
             </a:fld>
             <a:endParaRPr lang="en-US" altLang="en-US"/>
           </a:p>
@@ -9322,7 +9322,7 @@
                 </a:solidFill>
                 <a:latin typeface="+mn-lt"/>
               </a:rPr>
-              <a:t>R-Square: 0.6851  	Adjusted R-Square: 0.7038</a:t>
+              <a:t>R-Square: 0.5851  	Adjusted R-Square: 0.6038</a:t>
             </a:r>
           </a:p>
         </p:txBody>
@@ -10022,6 +10022,1256 @@
               <a:rPr lang="en-US" dirty="0"/>
               <a:t>Recommendation</a:t>
             </a:r>
+          </a:p>
+        </p:txBody>
+      </p:sp>
+      <p:sp>
+        <p:nvSpPr>
+          <p:cNvPr id="3" name="Content Placeholder 2">
+            <a:extLst>
+              <a:ext uri="{FF2B5EF4-FFF2-40B4-BE49-F238E27FC236}">
+                <a16:creationId xmlns:a16="http://schemas.microsoft.com/office/drawing/2014/main" id="{1C2A4226-BEF0-9146-A6A5-7CD1123FE4DF}"/>
+              </a:ext>
+            </a:extLst>
+          </p:cNvPr>
+          <p:cNvSpPr>
+            <a:spLocks noGrp="1"/>
+          </p:cNvSpPr>
+          <p:nvPr>
+            <p:ph idx="1"/>
+          </p:nvPr>
+        </p:nvSpPr>
+        <p:spPr>
+          <a:xfrm>
+            <a:off x="1373856" y="1516039"/>
+            <a:ext cx="7315200" cy="609600"/>
+          </a:xfrm>
+        </p:spPr>
+        <p:txBody>
+          <a:bodyPr/>
+          <a:lstStyle/>
+          <a:p>
+            <a:pPr marL="0" indent="0">
+              <a:buNone/>
+            </a:pPr>
+            <a:r>
+              <a:rPr lang="en-US" sz="1800" dirty="0"/>
+              <a:t>What factors and attributes of a county influence the results of presidential election?</a:t>
+            </a:r>
+          </a:p>
+        </p:txBody>
+      </p:sp>
+      <p:pic>
+        <p:nvPicPr>
+          <p:cNvPr id="4" name="Picture 3" descr="Icon&#10;&#10;Description automatically generated">
+            <a:extLst>
+              <a:ext uri="{FF2B5EF4-FFF2-40B4-BE49-F238E27FC236}">
+                <a16:creationId xmlns:a16="http://schemas.microsoft.com/office/drawing/2014/main" id="{59C6F3D5-7987-F147-9660-197A2C310A50}"/>
+              </a:ext>
+            </a:extLst>
+          </p:cNvPr>
+          <p:cNvPicPr>
+            <a:picLocks noChangeAspect="1"/>
+          </p:cNvPicPr>
+          <p:nvPr/>
+        </p:nvPicPr>
+        <p:blipFill>
+          <a:blip r:embed="rId2">
+            <a:extLst>
+              <a:ext uri="{BEBA8EAE-BF5A-486C-A8C5-ECC9F3942E4B}">
+                <a14:imgProps xmlns:a14="http://schemas.microsoft.com/office/drawing/2010/main">
+                  <a14:imgLayer r:embed="rId3">
+                    <a14:imgEffect>
+                      <a14:backgroundRemoval t="10000" b="90000" l="10000" r="90000"/>
+                    </a14:imgEffect>
+                  </a14:imgLayer>
+                </a14:imgProps>
+              </a:ext>
+            </a:extLst>
+          </a:blip>
+          <a:stretch>
+            <a:fillRect/>
+          </a:stretch>
+        </p:blipFill>
+        <p:spPr>
+          <a:xfrm>
+            <a:off x="457200" y="1572371"/>
+            <a:ext cx="916656" cy="553267"/>
+          </a:xfrm>
+          <a:prstGeom prst="rect">
+            <a:avLst/>
+          </a:prstGeom>
+        </p:spPr>
+      </p:pic>
+      <p:pic>
+        <p:nvPicPr>
+          <p:cNvPr id="5" name="Picture 4" descr="Icon&#10;&#10;Description automatically generated">
+            <a:extLst>
+              <a:ext uri="{FF2B5EF4-FFF2-40B4-BE49-F238E27FC236}">
+                <a16:creationId xmlns:a16="http://schemas.microsoft.com/office/drawing/2014/main" id="{0FE4492F-2DC9-8743-B451-4F0D69FE4353}"/>
+              </a:ext>
+            </a:extLst>
+          </p:cNvPr>
+          <p:cNvPicPr>
+            <a:picLocks noChangeAspect="1"/>
+          </p:cNvPicPr>
+          <p:nvPr/>
+        </p:nvPicPr>
+        <p:blipFill>
+          <a:blip r:embed="rId2">
+            <a:extLst>
+              <a:ext uri="{BEBA8EAE-BF5A-486C-A8C5-ECC9F3942E4B}">
+                <a14:imgProps xmlns:a14="http://schemas.microsoft.com/office/drawing/2010/main">
+                  <a14:imgLayer r:embed="rId3">
+                    <a14:imgEffect>
+                      <a14:backgroundRemoval t="10000" b="90000" l="10000" r="90000"/>
+                    </a14:imgEffect>
+                  </a14:imgLayer>
+                </a14:imgProps>
+              </a:ext>
+            </a:extLst>
+          </a:blip>
+          <a:stretch>
+            <a:fillRect/>
+          </a:stretch>
+        </p:blipFill>
+        <p:spPr>
+          <a:xfrm>
+            <a:off x="473660" y="3989997"/>
+            <a:ext cx="900197" cy="543333"/>
+          </a:xfrm>
+          <a:prstGeom prst="rect">
+            <a:avLst/>
+          </a:prstGeom>
+        </p:spPr>
+      </p:pic>
+      <p:sp>
+        <p:nvSpPr>
+          <p:cNvPr id="7" name="Content Placeholder 2">
+            <a:extLst>
+              <a:ext uri="{FF2B5EF4-FFF2-40B4-BE49-F238E27FC236}">
+                <a16:creationId xmlns:a16="http://schemas.microsoft.com/office/drawing/2014/main" id="{6CA22251-7BA4-054B-9B21-152C7E484829}"/>
+              </a:ext>
+            </a:extLst>
+          </p:cNvPr>
+          <p:cNvSpPr txBox="1">
+            <a:spLocks/>
+          </p:cNvSpPr>
+          <p:nvPr/>
+        </p:nvSpPr>
+        <p:spPr>
+          <a:xfrm>
+            <a:off x="1373856" y="3991136"/>
+            <a:ext cx="7315200" cy="609600"/>
+          </a:xfrm>
+          <a:prstGeom prst="rect">
+            <a:avLst/>
+          </a:prstGeom>
+        </p:spPr>
+        <p:txBody>
+          <a:bodyPr vert="horz" lIns="91440" tIns="45720" rIns="91440" bIns="45720" rtlCol="0">
+            <a:normAutofit/>
+          </a:bodyPr>
+          <a:lstStyle>
+            <a:lvl1pPr marL="228600" indent="-228600" algn="l" defTabSz="914400" rtl="0" eaLnBrk="1" latinLnBrk="0" hangingPunct="1">
+              <a:lnSpc>
+                <a:spcPct val="90000"/>
+              </a:lnSpc>
+              <a:spcBef>
+                <a:spcPts val="1000"/>
+              </a:spcBef>
+              <a:buFont typeface="Arial" panose="020B0604020202020204" pitchFamily="34" charset="0"/>
+              <a:buChar char="•"/>
+              <a:defRPr sz="2800" kern="1200">
+                <a:solidFill>
+                  <a:schemeClr val="tx1"/>
+                </a:solidFill>
+                <a:latin typeface="+mn-lt"/>
+                <a:ea typeface="+mn-ea"/>
+                <a:cs typeface="+mn-cs"/>
+              </a:defRPr>
+            </a:lvl1pPr>
+            <a:lvl2pPr marL="685800" indent="-228600" algn="l" defTabSz="914400" rtl="0" eaLnBrk="1" latinLnBrk="0" hangingPunct="1">
+              <a:lnSpc>
+                <a:spcPct val="90000"/>
+              </a:lnSpc>
+              <a:spcBef>
+                <a:spcPts val="500"/>
+              </a:spcBef>
+              <a:buFont typeface="Arial" panose="020B0604020202020204" pitchFamily="34" charset="0"/>
+              <a:buChar char="•"/>
+              <a:defRPr sz="2400" kern="1200">
+                <a:solidFill>
+                  <a:schemeClr val="tx1"/>
+                </a:solidFill>
+                <a:latin typeface="+mn-lt"/>
+                <a:ea typeface="+mn-ea"/>
+                <a:cs typeface="+mn-cs"/>
+              </a:defRPr>
+            </a:lvl2pPr>
+            <a:lvl3pPr marL="1143000" indent="-228600" algn="l" defTabSz="914400" rtl="0" eaLnBrk="1" latinLnBrk="0" hangingPunct="1">
+              <a:lnSpc>
+                <a:spcPct val="90000"/>
+              </a:lnSpc>
+              <a:spcBef>
+                <a:spcPts val="500"/>
+              </a:spcBef>
+              <a:buFont typeface="Arial" panose="020B0604020202020204" pitchFamily="34" charset="0"/>
+              <a:buChar char="•"/>
+              <a:defRPr sz="2000" kern="1200">
+                <a:solidFill>
+                  <a:schemeClr val="tx1"/>
+                </a:solidFill>
+                <a:latin typeface="+mn-lt"/>
+                <a:ea typeface="+mn-ea"/>
+                <a:cs typeface="+mn-cs"/>
+              </a:defRPr>
+            </a:lvl3pPr>
+            <a:lvl4pPr marL="1600200" indent="-228600" algn="l" defTabSz="914400" rtl="0" eaLnBrk="1" latinLnBrk="0" hangingPunct="1">
+              <a:lnSpc>
+                <a:spcPct val="90000"/>
+              </a:lnSpc>
+              <a:spcBef>
+                <a:spcPts val="500"/>
+              </a:spcBef>
+              <a:buFont typeface="Arial" panose="020B0604020202020204" pitchFamily="34" charset="0"/>
+              <a:buChar char="•"/>
+              <a:defRPr sz="1800" kern="1200">
+                <a:solidFill>
+                  <a:schemeClr val="tx1"/>
+                </a:solidFill>
+                <a:latin typeface="+mn-lt"/>
+                <a:ea typeface="+mn-ea"/>
+                <a:cs typeface="+mn-cs"/>
+              </a:defRPr>
+            </a:lvl4pPr>
+            <a:lvl5pPr marL="2057400" indent="-228600" algn="l" defTabSz="914400" rtl="0" eaLnBrk="1" latinLnBrk="0" hangingPunct="1">
+              <a:lnSpc>
+                <a:spcPct val="90000"/>
+              </a:lnSpc>
+              <a:spcBef>
+                <a:spcPts val="500"/>
+              </a:spcBef>
+              <a:buFont typeface="Arial" panose="020B0604020202020204" pitchFamily="34" charset="0"/>
+              <a:buChar char="•"/>
+              <a:defRPr sz="1800" kern="1200">
+                <a:solidFill>
+                  <a:schemeClr val="tx1"/>
+                </a:solidFill>
+                <a:latin typeface="+mn-lt"/>
+                <a:ea typeface="+mn-ea"/>
+                <a:cs typeface="+mn-cs"/>
+              </a:defRPr>
+            </a:lvl5pPr>
+            <a:lvl6pPr marL="2514600" indent="-228600" algn="l" defTabSz="914400" rtl="0" eaLnBrk="1" latinLnBrk="0" hangingPunct="1">
+              <a:lnSpc>
+                <a:spcPct val="90000"/>
+              </a:lnSpc>
+              <a:spcBef>
+                <a:spcPts val="500"/>
+              </a:spcBef>
+              <a:buFont typeface="Arial" panose="020B0604020202020204" pitchFamily="34" charset="0"/>
+              <a:buChar char="•"/>
+              <a:defRPr sz="1800" kern="1200">
+                <a:solidFill>
+                  <a:schemeClr val="tx1"/>
+                </a:solidFill>
+                <a:latin typeface="+mn-lt"/>
+                <a:ea typeface="+mn-ea"/>
+                <a:cs typeface="+mn-cs"/>
+              </a:defRPr>
+            </a:lvl6pPr>
+            <a:lvl7pPr marL="2971800" indent="-228600" algn="l" defTabSz="914400" rtl="0" eaLnBrk="1" latinLnBrk="0" hangingPunct="1">
+              <a:lnSpc>
+                <a:spcPct val="90000"/>
+              </a:lnSpc>
+              <a:spcBef>
+                <a:spcPts val="500"/>
+              </a:spcBef>
+              <a:buFont typeface="Arial" panose="020B0604020202020204" pitchFamily="34" charset="0"/>
+              <a:buChar char="•"/>
+              <a:defRPr sz="1800" kern="1200">
+                <a:solidFill>
+                  <a:schemeClr val="tx1"/>
+                </a:solidFill>
+                <a:latin typeface="+mn-lt"/>
+                <a:ea typeface="+mn-ea"/>
+                <a:cs typeface="+mn-cs"/>
+              </a:defRPr>
+            </a:lvl7pPr>
+            <a:lvl8pPr marL="3429000" indent="-228600" algn="l" defTabSz="914400" rtl="0" eaLnBrk="1" latinLnBrk="0" hangingPunct="1">
+              <a:lnSpc>
+                <a:spcPct val="90000"/>
+              </a:lnSpc>
+              <a:spcBef>
+                <a:spcPts val="500"/>
+              </a:spcBef>
+              <a:buFont typeface="Arial" panose="020B0604020202020204" pitchFamily="34" charset="0"/>
+              <a:buChar char="•"/>
+              <a:defRPr sz="1800" kern="1200">
+                <a:solidFill>
+                  <a:schemeClr val="tx1"/>
+                </a:solidFill>
+                <a:latin typeface="+mn-lt"/>
+                <a:ea typeface="+mn-ea"/>
+                <a:cs typeface="+mn-cs"/>
+              </a:defRPr>
+            </a:lvl8pPr>
+            <a:lvl9pPr marL="3886200" indent="-228600" algn="l" defTabSz="914400" rtl="0" eaLnBrk="1" latinLnBrk="0" hangingPunct="1">
+              <a:lnSpc>
+                <a:spcPct val="90000"/>
+              </a:lnSpc>
+              <a:spcBef>
+                <a:spcPts val="500"/>
+              </a:spcBef>
+              <a:buFont typeface="Arial" panose="020B0604020202020204" pitchFamily="34" charset="0"/>
+              <a:buChar char="•"/>
+              <a:defRPr sz="1800" kern="1200">
+                <a:solidFill>
+                  <a:schemeClr val="tx1"/>
+                </a:solidFill>
+                <a:latin typeface="+mn-lt"/>
+                <a:ea typeface="+mn-ea"/>
+                <a:cs typeface="+mn-cs"/>
+              </a:defRPr>
+            </a:lvl9pPr>
+          </a:lstStyle>
+          <a:p>
+            <a:pPr marL="0" indent="0">
+              <a:buNone/>
+            </a:pPr>
+            <a:r>
+              <a:rPr lang="en-US" sz="1800" dirty="0"/>
+              <a:t>Can we predict which party will win the 2016 presidential election in each county?</a:t>
+            </a:r>
+          </a:p>
+        </p:txBody>
+      </p:sp>
+      <p:sp>
+        <p:nvSpPr>
+          <p:cNvPr id="8" name="Content Placeholder 2">
+            <a:extLst>
+              <a:ext uri="{FF2B5EF4-FFF2-40B4-BE49-F238E27FC236}">
+                <a16:creationId xmlns:a16="http://schemas.microsoft.com/office/drawing/2014/main" id="{C6010EF2-B1E4-0A4F-9F48-5639EEA13DE6}"/>
+              </a:ext>
+            </a:extLst>
+          </p:cNvPr>
+          <p:cNvSpPr txBox="1">
+            <a:spLocks/>
+          </p:cNvSpPr>
+          <p:nvPr/>
+        </p:nvSpPr>
+        <p:spPr>
+          <a:xfrm>
+            <a:off x="1373856" y="2383119"/>
+            <a:ext cx="7312944" cy="1299500"/>
+          </a:xfrm>
+          <a:prstGeom prst="rect">
+            <a:avLst/>
+          </a:prstGeom>
+        </p:spPr>
+        <p:txBody>
+          <a:bodyPr vert="horz" lIns="91440" tIns="45720" rIns="91440" bIns="45720" numCol="2" rtlCol="0">
+            <a:noAutofit/>
+          </a:bodyPr>
+          <a:lstStyle>
+            <a:lvl1pPr marL="228600" indent="-228600" algn="l" defTabSz="914400" rtl="0" eaLnBrk="1" latinLnBrk="0" hangingPunct="1">
+              <a:lnSpc>
+                <a:spcPct val="90000"/>
+              </a:lnSpc>
+              <a:spcBef>
+                <a:spcPts val="1000"/>
+              </a:spcBef>
+              <a:buFont typeface="Arial" panose="020B0604020202020204" pitchFamily="34" charset="0"/>
+              <a:buChar char="•"/>
+              <a:defRPr sz="2800" kern="1200">
+                <a:solidFill>
+                  <a:schemeClr val="tx1"/>
+                </a:solidFill>
+                <a:latin typeface="+mn-lt"/>
+                <a:ea typeface="+mn-ea"/>
+                <a:cs typeface="+mn-cs"/>
+              </a:defRPr>
+            </a:lvl1pPr>
+            <a:lvl2pPr marL="685800" indent="-228600" algn="l" defTabSz="914400" rtl="0" eaLnBrk="1" latinLnBrk="0" hangingPunct="1">
+              <a:lnSpc>
+                <a:spcPct val="90000"/>
+              </a:lnSpc>
+              <a:spcBef>
+                <a:spcPts val="500"/>
+              </a:spcBef>
+              <a:buFont typeface="Arial" panose="020B0604020202020204" pitchFamily="34" charset="0"/>
+              <a:buChar char="•"/>
+              <a:defRPr sz="2400" kern="1200">
+                <a:solidFill>
+                  <a:schemeClr val="tx1"/>
+                </a:solidFill>
+                <a:latin typeface="+mn-lt"/>
+                <a:ea typeface="+mn-ea"/>
+                <a:cs typeface="+mn-cs"/>
+              </a:defRPr>
+            </a:lvl2pPr>
+            <a:lvl3pPr marL="1143000" indent="-228600" algn="l" defTabSz="914400" rtl="0" eaLnBrk="1" latinLnBrk="0" hangingPunct="1">
+              <a:lnSpc>
+                <a:spcPct val="90000"/>
+              </a:lnSpc>
+              <a:spcBef>
+                <a:spcPts val="500"/>
+              </a:spcBef>
+              <a:buFont typeface="Arial" panose="020B0604020202020204" pitchFamily="34" charset="0"/>
+              <a:buChar char="•"/>
+              <a:defRPr sz="2000" kern="1200">
+                <a:solidFill>
+                  <a:schemeClr val="tx1"/>
+                </a:solidFill>
+                <a:latin typeface="+mn-lt"/>
+                <a:ea typeface="+mn-ea"/>
+                <a:cs typeface="+mn-cs"/>
+              </a:defRPr>
+            </a:lvl3pPr>
+            <a:lvl4pPr marL="1600200" indent="-228600" algn="l" defTabSz="914400" rtl="0" eaLnBrk="1" latinLnBrk="0" hangingPunct="1">
+              <a:lnSpc>
+                <a:spcPct val="90000"/>
+              </a:lnSpc>
+              <a:spcBef>
+                <a:spcPts val="500"/>
+              </a:spcBef>
+              <a:buFont typeface="Arial" panose="020B0604020202020204" pitchFamily="34" charset="0"/>
+              <a:buChar char="•"/>
+              <a:defRPr sz="1800" kern="1200">
+                <a:solidFill>
+                  <a:schemeClr val="tx1"/>
+                </a:solidFill>
+                <a:latin typeface="+mn-lt"/>
+                <a:ea typeface="+mn-ea"/>
+                <a:cs typeface="+mn-cs"/>
+              </a:defRPr>
+            </a:lvl4pPr>
+            <a:lvl5pPr marL="2057400" indent="-228600" algn="l" defTabSz="914400" rtl="0" eaLnBrk="1" latinLnBrk="0" hangingPunct="1">
+              <a:lnSpc>
+                <a:spcPct val="90000"/>
+              </a:lnSpc>
+              <a:spcBef>
+                <a:spcPts val="500"/>
+              </a:spcBef>
+              <a:buFont typeface="Arial" panose="020B0604020202020204" pitchFamily="34" charset="0"/>
+              <a:buChar char="•"/>
+              <a:defRPr sz="1800" kern="1200">
+                <a:solidFill>
+                  <a:schemeClr val="tx1"/>
+                </a:solidFill>
+                <a:latin typeface="+mn-lt"/>
+                <a:ea typeface="+mn-ea"/>
+                <a:cs typeface="+mn-cs"/>
+              </a:defRPr>
+            </a:lvl5pPr>
+            <a:lvl6pPr marL="2514600" indent="-228600" algn="l" defTabSz="914400" rtl="0" eaLnBrk="1" latinLnBrk="0" hangingPunct="1">
+              <a:lnSpc>
+                <a:spcPct val="90000"/>
+              </a:lnSpc>
+              <a:spcBef>
+                <a:spcPts val="500"/>
+              </a:spcBef>
+              <a:buFont typeface="Arial" panose="020B0604020202020204" pitchFamily="34" charset="0"/>
+              <a:buChar char="•"/>
+              <a:defRPr sz="1800" kern="1200">
+                <a:solidFill>
+                  <a:schemeClr val="tx1"/>
+                </a:solidFill>
+                <a:latin typeface="+mn-lt"/>
+                <a:ea typeface="+mn-ea"/>
+                <a:cs typeface="+mn-cs"/>
+              </a:defRPr>
+            </a:lvl6pPr>
+            <a:lvl7pPr marL="2971800" indent="-228600" algn="l" defTabSz="914400" rtl="0" eaLnBrk="1" latinLnBrk="0" hangingPunct="1">
+              <a:lnSpc>
+                <a:spcPct val="90000"/>
+              </a:lnSpc>
+              <a:spcBef>
+                <a:spcPts val="500"/>
+              </a:spcBef>
+              <a:buFont typeface="Arial" panose="020B0604020202020204" pitchFamily="34" charset="0"/>
+              <a:buChar char="•"/>
+              <a:defRPr sz="1800" kern="1200">
+                <a:solidFill>
+                  <a:schemeClr val="tx1"/>
+                </a:solidFill>
+                <a:latin typeface="+mn-lt"/>
+                <a:ea typeface="+mn-ea"/>
+                <a:cs typeface="+mn-cs"/>
+              </a:defRPr>
+            </a:lvl7pPr>
+            <a:lvl8pPr marL="3429000" indent="-228600" algn="l" defTabSz="914400" rtl="0" eaLnBrk="1" latinLnBrk="0" hangingPunct="1">
+              <a:lnSpc>
+                <a:spcPct val="90000"/>
+              </a:lnSpc>
+              <a:spcBef>
+                <a:spcPts val="500"/>
+              </a:spcBef>
+              <a:buFont typeface="Arial" panose="020B0604020202020204" pitchFamily="34" charset="0"/>
+              <a:buChar char="•"/>
+              <a:defRPr sz="1800" kern="1200">
+                <a:solidFill>
+                  <a:schemeClr val="tx1"/>
+                </a:solidFill>
+                <a:latin typeface="+mn-lt"/>
+                <a:ea typeface="+mn-ea"/>
+                <a:cs typeface="+mn-cs"/>
+              </a:defRPr>
+            </a:lvl8pPr>
+            <a:lvl9pPr marL="3886200" indent="-228600" algn="l" defTabSz="914400" rtl="0" eaLnBrk="1" latinLnBrk="0" hangingPunct="1">
+              <a:lnSpc>
+                <a:spcPct val="90000"/>
+              </a:lnSpc>
+              <a:spcBef>
+                <a:spcPts val="500"/>
+              </a:spcBef>
+              <a:buFont typeface="Arial" panose="020B0604020202020204" pitchFamily="34" charset="0"/>
+              <a:buChar char="•"/>
+              <a:defRPr sz="1800" kern="1200">
+                <a:solidFill>
+                  <a:schemeClr val="tx1"/>
+                </a:solidFill>
+                <a:latin typeface="+mn-lt"/>
+                <a:ea typeface="+mn-ea"/>
+                <a:cs typeface="+mn-cs"/>
+              </a:defRPr>
+            </a:lvl9pPr>
+          </a:lstStyle>
+          <a:p>
+            <a:pPr marL="285750" indent="-285750">
+              <a:spcAft>
+                <a:spcPts val="400"/>
+              </a:spcAft>
+              <a:buFont typeface="Wingdings" pitchFamily="2" charset="2"/>
+              <a:buChar char="§"/>
+            </a:pPr>
+            <a:r>
+              <a:rPr lang="en-US" sz="1400" dirty="0">
+                <a:latin typeface="+mn-lt"/>
+              </a:rPr>
+              <a:t>Unemployment Rate</a:t>
+            </a:r>
+          </a:p>
+          <a:p>
+            <a:pPr marL="285750" indent="-285750">
+              <a:spcAft>
+                <a:spcPts val="400"/>
+              </a:spcAft>
+              <a:buFont typeface="Wingdings" pitchFamily="2" charset="2"/>
+              <a:buChar char="§"/>
+            </a:pPr>
+            <a:r>
+              <a:rPr lang="en-US" sz="1400" dirty="0">
+                <a:latin typeface="+mn-lt"/>
+              </a:rPr>
+              <a:t>Race (African American, American Indian, Asian, White)</a:t>
+            </a:r>
+          </a:p>
+          <a:p>
+            <a:pPr marL="285750" indent="-285750">
+              <a:spcAft>
+                <a:spcPts val="400"/>
+              </a:spcAft>
+              <a:buFont typeface="Wingdings" pitchFamily="2" charset="2"/>
+              <a:buChar char="§"/>
+            </a:pPr>
+            <a:r>
+              <a:rPr lang="en-US" sz="1400" dirty="0">
+                <a:latin typeface="+mn-lt"/>
+              </a:rPr>
+              <a:t>Median Household Income</a:t>
+            </a:r>
+          </a:p>
+          <a:p>
+            <a:pPr marL="285750" indent="-285750">
+              <a:spcAft>
+                <a:spcPts val="400"/>
+              </a:spcAft>
+              <a:buFont typeface="Wingdings" pitchFamily="2" charset="2"/>
+              <a:buChar char="§"/>
+            </a:pPr>
+            <a:r>
+              <a:rPr lang="en-US" sz="1400" dirty="0">
+                <a:latin typeface="+mn-lt"/>
+              </a:rPr>
+              <a:t>Poverty Estimators</a:t>
+            </a:r>
+          </a:p>
+          <a:p>
+            <a:pPr marL="285750" indent="-285750">
+              <a:spcAft>
+                <a:spcPts val="400"/>
+              </a:spcAft>
+              <a:buFont typeface="Wingdings" pitchFamily="2" charset="2"/>
+              <a:buChar char="§"/>
+            </a:pPr>
+            <a:r>
+              <a:rPr lang="en-US" sz="1400" dirty="0">
+                <a:latin typeface="+mn-lt"/>
+              </a:rPr>
+              <a:t>Educational Attainments (Diploma, Bachelor, Masters, PhD.)</a:t>
+            </a:r>
+          </a:p>
+          <a:p>
+            <a:pPr marL="285750" indent="-285750">
+              <a:spcAft>
+                <a:spcPts val="400"/>
+              </a:spcAft>
+              <a:buFont typeface="Wingdings" pitchFamily="2" charset="2"/>
+              <a:buChar char="§"/>
+            </a:pPr>
+            <a:r>
+              <a:rPr lang="en-US" sz="1400" dirty="0">
+                <a:latin typeface="+mn-lt"/>
+              </a:rPr>
+              <a:t>Migration Rates</a:t>
+            </a:r>
+          </a:p>
+        </p:txBody>
+      </p:sp>
+      <p:pic>
+        <p:nvPicPr>
+          <p:cNvPr id="9" name="Picture 8" descr="Text&#10;&#10;Description automatically generated with medium confidence">
+            <a:extLst>
+              <a:ext uri="{FF2B5EF4-FFF2-40B4-BE49-F238E27FC236}">
+                <a16:creationId xmlns:a16="http://schemas.microsoft.com/office/drawing/2014/main" id="{AC0097EB-C55D-0645-A7B4-98B1A2537EEE}"/>
+              </a:ext>
+            </a:extLst>
+          </p:cNvPr>
+          <p:cNvPicPr>
+            <a:picLocks noChangeAspect="1"/>
+          </p:cNvPicPr>
+          <p:nvPr/>
+        </p:nvPicPr>
+        <p:blipFill rotWithShape="1">
+          <a:blip r:embed="rId4"/>
+          <a:srcRect l="27069" t="23333" r="20691" b="32223"/>
+          <a:stretch/>
+        </p:blipFill>
+        <p:spPr>
+          <a:xfrm>
+            <a:off x="539077" y="2334372"/>
+            <a:ext cx="769362" cy="707094"/>
+          </a:xfrm>
+          <a:prstGeom prst="rect">
+            <a:avLst/>
+          </a:prstGeom>
+        </p:spPr>
+      </p:pic>
+      <p:sp>
+        <p:nvSpPr>
+          <p:cNvPr id="10" name="Content Placeholder 2">
+            <a:extLst>
+              <a:ext uri="{FF2B5EF4-FFF2-40B4-BE49-F238E27FC236}">
+                <a16:creationId xmlns:a16="http://schemas.microsoft.com/office/drawing/2014/main" id="{13026294-34D8-6649-90CD-44D80C7F7C9D}"/>
+              </a:ext>
+            </a:extLst>
+          </p:cNvPr>
+          <p:cNvSpPr txBox="1">
+            <a:spLocks/>
+          </p:cNvSpPr>
+          <p:nvPr/>
+        </p:nvSpPr>
+        <p:spPr>
+          <a:xfrm>
+            <a:off x="1373856" y="4768143"/>
+            <a:ext cx="7312944" cy="1299500"/>
+          </a:xfrm>
+          <a:prstGeom prst="rect">
+            <a:avLst/>
+          </a:prstGeom>
+        </p:spPr>
+        <p:txBody>
+          <a:bodyPr vert="horz" lIns="91440" tIns="45720" rIns="91440" bIns="45720" numCol="1" rtlCol="0">
+            <a:noAutofit/>
+          </a:bodyPr>
+          <a:lstStyle>
+            <a:lvl1pPr marL="228600" indent="-228600" algn="l" defTabSz="914400" rtl="0" eaLnBrk="1" latinLnBrk="0" hangingPunct="1">
+              <a:lnSpc>
+                <a:spcPct val="90000"/>
+              </a:lnSpc>
+              <a:spcBef>
+                <a:spcPts val="1000"/>
+              </a:spcBef>
+              <a:buFont typeface="Arial" panose="020B0604020202020204" pitchFamily="34" charset="0"/>
+              <a:buChar char="•"/>
+              <a:defRPr sz="2800" kern="1200">
+                <a:solidFill>
+                  <a:schemeClr val="tx1"/>
+                </a:solidFill>
+                <a:latin typeface="+mn-lt"/>
+                <a:ea typeface="+mn-ea"/>
+                <a:cs typeface="+mn-cs"/>
+              </a:defRPr>
+            </a:lvl1pPr>
+            <a:lvl2pPr marL="685800" indent="-228600" algn="l" defTabSz="914400" rtl="0" eaLnBrk="1" latinLnBrk="0" hangingPunct="1">
+              <a:lnSpc>
+                <a:spcPct val="90000"/>
+              </a:lnSpc>
+              <a:spcBef>
+                <a:spcPts val="500"/>
+              </a:spcBef>
+              <a:buFont typeface="Arial" panose="020B0604020202020204" pitchFamily="34" charset="0"/>
+              <a:buChar char="•"/>
+              <a:defRPr sz="2400" kern="1200">
+                <a:solidFill>
+                  <a:schemeClr val="tx1"/>
+                </a:solidFill>
+                <a:latin typeface="+mn-lt"/>
+                <a:ea typeface="+mn-ea"/>
+                <a:cs typeface="+mn-cs"/>
+              </a:defRPr>
+            </a:lvl2pPr>
+            <a:lvl3pPr marL="1143000" indent="-228600" algn="l" defTabSz="914400" rtl="0" eaLnBrk="1" latinLnBrk="0" hangingPunct="1">
+              <a:lnSpc>
+                <a:spcPct val="90000"/>
+              </a:lnSpc>
+              <a:spcBef>
+                <a:spcPts val="500"/>
+              </a:spcBef>
+              <a:buFont typeface="Arial" panose="020B0604020202020204" pitchFamily="34" charset="0"/>
+              <a:buChar char="•"/>
+              <a:defRPr sz="2000" kern="1200">
+                <a:solidFill>
+                  <a:schemeClr val="tx1"/>
+                </a:solidFill>
+                <a:latin typeface="+mn-lt"/>
+                <a:ea typeface="+mn-ea"/>
+                <a:cs typeface="+mn-cs"/>
+              </a:defRPr>
+            </a:lvl3pPr>
+            <a:lvl4pPr marL="1600200" indent="-228600" algn="l" defTabSz="914400" rtl="0" eaLnBrk="1" latinLnBrk="0" hangingPunct="1">
+              <a:lnSpc>
+                <a:spcPct val="90000"/>
+              </a:lnSpc>
+              <a:spcBef>
+                <a:spcPts val="500"/>
+              </a:spcBef>
+              <a:buFont typeface="Arial" panose="020B0604020202020204" pitchFamily="34" charset="0"/>
+              <a:buChar char="•"/>
+              <a:defRPr sz="1800" kern="1200">
+                <a:solidFill>
+                  <a:schemeClr val="tx1"/>
+                </a:solidFill>
+                <a:latin typeface="+mn-lt"/>
+                <a:ea typeface="+mn-ea"/>
+                <a:cs typeface="+mn-cs"/>
+              </a:defRPr>
+            </a:lvl4pPr>
+            <a:lvl5pPr marL="2057400" indent="-228600" algn="l" defTabSz="914400" rtl="0" eaLnBrk="1" latinLnBrk="0" hangingPunct="1">
+              <a:lnSpc>
+                <a:spcPct val="90000"/>
+              </a:lnSpc>
+              <a:spcBef>
+                <a:spcPts val="500"/>
+              </a:spcBef>
+              <a:buFont typeface="Arial" panose="020B0604020202020204" pitchFamily="34" charset="0"/>
+              <a:buChar char="•"/>
+              <a:defRPr sz="1800" kern="1200">
+                <a:solidFill>
+                  <a:schemeClr val="tx1"/>
+                </a:solidFill>
+                <a:latin typeface="+mn-lt"/>
+                <a:ea typeface="+mn-ea"/>
+                <a:cs typeface="+mn-cs"/>
+              </a:defRPr>
+            </a:lvl5pPr>
+            <a:lvl6pPr marL="2514600" indent="-228600" algn="l" defTabSz="914400" rtl="0" eaLnBrk="1" latinLnBrk="0" hangingPunct="1">
+              <a:lnSpc>
+                <a:spcPct val="90000"/>
+              </a:lnSpc>
+              <a:spcBef>
+                <a:spcPts val="500"/>
+              </a:spcBef>
+              <a:buFont typeface="Arial" panose="020B0604020202020204" pitchFamily="34" charset="0"/>
+              <a:buChar char="•"/>
+              <a:defRPr sz="1800" kern="1200">
+                <a:solidFill>
+                  <a:schemeClr val="tx1"/>
+                </a:solidFill>
+                <a:latin typeface="+mn-lt"/>
+                <a:ea typeface="+mn-ea"/>
+                <a:cs typeface="+mn-cs"/>
+              </a:defRPr>
+            </a:lvl6pPr>
+            <a:lvl7pPr marL="2971800" indent="-228600" algn="l" defTabSz="914400" rtl="0" eaLnBrk="1" latinLnBrk="0" hangingPunct="1">
+              <a:lnSpc>
+                <a:spcPct val="90000"/>
+              </a:lnSpc>
+              <a:spcBef>
+                <a:spcPts val="500"/>
+              </a:spcBef>
+              <a:buFont typeface="Arial" panose="020B0604020202020204" pitchFamily="34" charset="0"/>
+              <a:buChar char="•"/>
+              <a:defRPr sz="1800" kern="1200">
+                <a:solidFill>
+                  <a:schemeClr val="tx1"/>
+                </a:solidFill>
+                <a:latin typeface="+mn-lt"/>
+                <a:ea typeface="+mn-ea"/>
+                <a:cs typeface="+mn-cs"/>
+              </a:defRPr>
+            </a:lvl7pPr>
+            <a:lvl8pPr marL="3429000" indent="-228600" algn="l" defTabSz="914400" rtl="0" eaLnBrk="1" latinLnBrk="0" hangingPunct="1">
+              <a:lnSpc>
+                <a:spcPct val="90000"/>
+              </a:lnSpc>
+              <a:spcBef>
+                <a:spcPts val="500"/>
+              </a:spcBef>
+              <a:buFont typeface="Arial" panose="020B0604020202020204" pitchFamily="34" charset="0"/>
+              <a:buChar char="•"/>
+              <a:defRPr sz="1800" kern="1200">
+                <a:solidFill>
+                  <a:schemeClr val="tx1"/>
+                </a:solidFill>
+                <a:latin typeface="+mn-lt"/>
+                <a:ea typeface="+mn-ea"/>
+                <a:cs typeface="+mn-cs"/>
+              </a:defRPr>
+            </a:lvl8pPr>
+            <a:lvl9pPr marL="3886200" indent="-228600" algn="l" defTabSz="914400" rtl="0" eaLnBrk="1" latinLnBrk="0" hangingPunct="1">
+              <a:lnSpc>
+                <a:spcPct val="90000"/>
+              </a:lnSpc>
+              <a:spcBef>
+                <a:spcPts val="500"/>
+              </a:spcBef>
+              <a:buFont typeface="Arial" panose="020B0604020202020204" pitchFamily="34" charset="0"/>
+              <a:buChar char="•"/>
+              <a:defRPr sz="1800" kern="1200">
+                <a:solidFill>
+                  <a:schemeClr val="tx1"/>
+                </a:solidFill>
+                <a:latin typeface="+mn-lt"/>
+                <a:ea typeface="+mn-ea"/>
+                <a:cs typeface="+mn-cs"/>
+              </a:defRPr>
+            </a:lvl9pPr>
+          </a:lstStyle>
+          <a:p>
+            <a:pPr marL="0" indent="0">
+              <a:spcAft>
+                <a:spcPts val="400"/>
+              </a:spcAft>
+              <a:buNone/>
+            </a:pPr>
+            <a:r>
+              <a:rPr lang="en-US" sz="1400" dirty="0">
+                <a:latin typeface="+mn-lt"/>
+              </a:rPr>
+              <a:t>Accuracy of around 60% which suggests that we were able to </a:t>
+            </a:r>
+            <a:r>
+              <a:rPr lang="en-US" sz="1400" dirty="0"/>
+              <a:t>predict the winning party of the US Presidential election in 60% of the counties correctly along with the usage of external data. For now, we can say that democrats have solid base in counties having </a:t>
+            </a:r>
+          </a:p>
+          <a:p>
+            <a:pPr marL="0" indent="0">
+              <a:spcAft>
+                <a:spcPts val="400"/>
+              </a:spcAft>
+              <a:buNone/>
+            </a:pPr>
+            <a:endParaRPr lang="en-US" sz="1400" dirty="0">
+              <a:latin typeface="+mn-lt"/>
+            </a:endParaRPr>
+          </a:p>
+          <a:p>
+            <a:pPr marL="0" indent="0">
+              <a:spcAft>
+                <a:spcPts val="400"/>
+              </a:spcAft>
+              <a:buNone/>
+            </a:pPr>
+            <a:endParaRPr lang="en-US" sz="1400" dirty="0"/>
+          </a:p>
+          <a:p>
+            <a:pPr marL="0" indent="0">
+              <a:spcAft>
+                <a:spcPts val="400"/>
+              </a:spcAft>
+              <a:buNone/>
+            </a:pPr>
+            <a:r>
+              <a:rPr lang="en-US" sz="1400" dirty="0">
+                <a:latin typeface="+mn-lt"/>
+              </a:rPr>
+              <a:t>However, we also need more dimensionality to the </a:t>
+            </a:r>
+            <a:r>
+              <a:rPr lang="en-US" sz="1400" dirty="0"/>
+              <a:t>analysis data to achieve more accuracy.</a:t>
+            </a:r>
+            <a:endParaRPr lang="en-US" sz="1400" dirty="0">
+              <a:latin typeface="+mn-lt"/>
+            </a:endParaRPr>
+          </a:p>
+        </p:txBody>
+      </p:sp>
+      <p:sp>
+        <p:nvSpPr>
+          <p:cNvPr id="13" name="Round Diagonal Corner of Rectangle 12">
+            <a:extLst>
+              <a:ext uri="{FF2B5EF4-FFF2-40B4-BE49-F238E27FC236}">
+                <a16:creationId xmlns:a16="http://schemas.microsoft.com/office/drawing/2014/main" id="{14DE65E5-7139-6345-92D9-563F859E35F2}"/>
+              </a:ext>
+            </a:extLst>
+          </p:cNvPr>
+          <p:cNvSpPr/>
+          <p:nvPr/>
+        </p:nvSpPr>
+        <p:spPr>
+          <a:xfrm>
+            <a:off x="304800" y="1371600"/>
+            <a:ext cx="8534400" cy="2311019"/>
+          </a:xfrm>
+          <a:prstGeom prst="round2DiagRect">
+            <a:avLst/>
+          </a:prstGeom>
+          <a:noFill/>
+        </p:spPr>
+        <p:style>
+          <a:lnRef idx="1">
+            <a:schemeClr val="accent1"/>
+          </a:lnRef>
+          <a:fillRef idx="3">
+            <a:schemeClr val="accent1"/>
+          </a:fillRef>
+          <a:effectRef idx="2">
+            <a:schemeClr val="accent1"/>
+          </a:effectRef>
+          <a:fontRef idx="minor">
+            <a:schemeClr val="lt1"/>
+          </a:fontRef>
+        </p:style>
+        <p:txBody>
+          <a:bodyPr rtlCol="0" anchor="ctr"/>
+          <a:lstStyle/>
+          <a:p>
+            <a:pPr algn="ctr"/>
+            <a:endParaRPr lang="en-US"/>
+          </a:p>
+        </p:txBody>
+      </p:sp>
+      <p:pic>
+        <p:nvPicPr>
+          <p:cNvPr id="11" name="Picture 10" descr="Text&#10;&#10;Description automatically generated with medium confidence">
+            <a:extLst>
+              <a:ext uri="{FF2B5EF4-FFF2-40B4-BE49-F238E27FC236}">
+                <a16:creationId xmlns:a16="http://schemas.microsoft.com/office/drawing/2014/main" id="{A8D9B826-4684-D149-A3A0-37F21C2A486F}"/>
+              </a:ext>
+            </a:extLst>
+          </p:cNvPr>
+          <p:cNvPicPr>
+            <a:picLocks noChangeAspect="1"/>
+          </p:cNvPicPr>
+          <p:nvPr/>
+        </p:nvPicPr>
+        <p:blipFill rotWithShape="1">
+          <a:blip r:embed="rId4"/>
+          <a:srcRect l="27069" t="23333" r="20691" b="32223"/>
+          <a:stretch/>
+        </p:blipFill>
+        <p:spPr>
+          <a:xfrm>
+            <a:off x="539077" y="4719396"/>
+            <a:ext cx="769362" cy="707094"/>
+          </a:xfrm>
+          <a:prstGeom prst="rect">
+            <a:avLst/>
+          </a:prstGeom>
+        </p:spPr>
+      </p:pic>
+      <p:sp>
+        <p:nvSpPr>
+          <p:cNvPr id="12" name="Content Placeholder 2">
+            <a:extLst>
+              <a:ext uri="{FF2B5EF4-FFF2-40B4-BE49-F238E27FC236}">
+                <a16:creationId xmlns:a16="http://schemas.microsoft.com/office/drawing/2014/main" id="{374703A5-0EAF-1746-9C7A-432893AA009A}"/>
+              </a:ext>
+            </a:extLst>
+          </p:cNvPr>
+          <p:cNvSpPr txBox="1">
+            <a:spLocks/>
+          </p:cNvSpPr>
+          <p:nvPr/>
+        </p:nvSpPr>
+        <p:spPr>
+          <a:xfrm>
+            <a:off x="1526256" y="5493751"/>
+            <a:ext cx="8229600" cy="678449"/>
+          </a:xfrm>
+          <a:prstGeom prst="rect">
+            <a:avLst/>
+          </a:prstGeom>
+        </p:spPr>
+        <p:txBody>
+          <a:bodyPr vert="horz" lIns="91440" tIns="45720" rIns="91440" bIns="45720" numCol="2" rtlCol="0">
+            <a:noAutofit/>
+          </a:bodyPr>
+          <a:lstStyle>
+            <a:lvl1pPr marL="228600" indent="-228600" algn="l" defTabSz="914400" rtl="0" eaLnBrk="1" latinLnBrk="0" hangingPunct="1">
+              <a:lnSpc>
+                <a:spcPct val="90000"/>
+              </a:lnSpc>
+              <a:spcBef>
+                <a:spcPts val="1000"/>
+              </a:spcBef>
+              <a:buFont typeface="Arial" panose="020B0604020202020204" pitchFamily="34" charset="0"/>
+              <a:buChar char="•"/>
+              <a:defRPr sz="2800" kern="1200">
+                <a:solidFill>
+                  <a:schemeClr val="tx1"/>
+                </a:solidFill>
+                <a:latin typeface="+mn-lt"/>
+                <a:ea typeface="+mn-ea"/>
+                <a:cs typeface="+mn-cs"/>
+              </a:defRPr>
+            </a:lvl1pPr>
+            <a:lvl2pPr marL="685800" indent="-228600" algn="l" defTabSz="914400" rtl="0" eaLnBrk="1" latinLnBrk="0" hangingPunct="1">
+              <a:lnSpc>
+                <a:spcPct val="90000"/>
+              </a:lnSpc>
+              <a:spcBef>
+                <a:spcPts val="500"/>
+              </a:spcBef>
+              <a:buFont typeface="Arial" panose="020B0604020202020204" pitchFamily="34" charset="0"/>
+              <a:buChar char="•"/>
+              <a:defRPr sz="2400" kern="1200">
+                <a:solidFill>
+                  <a:schemeClr val="tx1"/>
+                </a:solidFill>
+                <a:latin typeface="+mn-lt"/>
+                <a:ea typeface="+mn-ea"/>
+                <a:cs typeface="+mn-cs"/>
+              </a:defRPr>
+            </a:lvl2pPr>
+            <a:lvl3pPr marL="1143000" indent="-228600" algn="l" defTabSz="914400" rtl="0" eaLnBrk="1" latinLnBrk="0" hangingPunct="1">
+              <a:lnSpc>
+                <a:spcPct val="90000"/>
+              </a:lnSpc>
+              <a:spcBef>
+                <a:spcPts val="500"/>
+              </a:spcBef>
+              <a:buFont typeface="Arial" panose="020B0604020202020204" pitchFamily="34" charset="0"/>
+              <a:buChar char="•"/>
+              <a:defRPr sz="2000" kern="1200">
+                <a:solidFill>
+                  <a:schemeClr val="tx1"/>
+                </a:solidFill>
+                <a:latin typeface="+mn-lt"/>
+                <a:ea typeface="+mn-ea"/>
+                <a:cs typeface="+mn-cs"/>
+              </a:defRPr>
+            </a:lvl3pPr>
+            <a:lvl4pPr marL="1600200" indent="-228600" algn="l" defTabSz="914400" rtl="0" eaLnBrk="1" latinLnBrk="0" hangingPunct="1">
+              <a:lnSpc>
+                <a:spcPct val="90000"/>
+              </a:lnSpc>
+              <a:spcBef>
+                <a:spcPts val="500"/>
+              </a:spcBef>
+              <a:buFont typeface="Arial" panose="020B0604020202020204" pitchFamily="34" charset="0"/>
+              <a:buChar char="•"/>
+              <a:defRPr sz="1800" kern="1200">
+                <a:solidFill>
+                  <a:schemeClr val="tx1"/>
+                </a:solidFill>
+                <a:latin typeface="+mn-lt"/>
+                <a:ea typeface="+mn-ea"/>
+                <a:cs typeface="+mn-cs"/>
+              </a:defRPr>
+            </a:lvl4pPr>
+            <a:lvl5pPr marL="2057400" indent="-228600" algn="l" defTabSz="914400" rtl="0" eaLnBrk="1" latinLnBrk="0" hangingPunct="1">
+              <a:lnSpc>
+                <a:spcPct val="90000"/>
+              </a:lnSpc>
+              <a:spcBef>
+                <a:spcPts val="500"/>
+              </a:spcBef>
+              <a:buFont typeface="Arial" panose="020B0604020202020204" pitchFamily="34" charset="0"/>
+              <a:buChar char="•"/>
+              <a:defRPr sz="1800" kern="1200">
+                <a:solidFill>
+                  <a:schemeClr val="tx1"/>
+                </a:solidFill>
+                <a:latin typeface="+mn-lt"/>
+                <a:ea typeface="+mn-ea"/>
+                <a:cs typeface="+mn-cs"/>
+              </a:defRPr>
+            </a:lvl5pPr>
+            <a:lvl6pPr marL="2514600" indent="-228600" algn="l" defTabSz="914400" rtl="0" eaLnBrk="1" latinLnBrk="0" hangingPunct="1">
+              <a:lnSpc>
+                <a:spcPct val="90000"/>
+              </a:lnSpc>
+              <a:spcBef>
+                <a:spcPts val="500"/>
+              </a:spcBef>
+              <a:buFont typeface="Arial" panose="020B0604020202020204" pitchFamily="34" charset="0"/>
+              <a:buChar char="•"/>
+              <a:defRPr sz="1800" kern="1200">
+                <a:solidFill>
+                  <a:schemeClr val="tx1"/>
+                </a:solidFill>
+                <a:latin typeface="+mn-lt"/>
+                <a:ea typeface="+mn-ea"/>
+                <a:cs typeface="+mn-cs"/>
+              </a:defRPr>
+            </a:lvl6pPr>
+            <a:lvl7pPr marL="2971800" indent="-228600" algn="l" defTabSz="914400" rtl="0" eaLnBrk="1" latinLnBrk="0" hangingPunct="1">
+              <a:lnSpc>
+                <a:spcPct val="90000"/>
+              </a:lnSpc>
+              <a:spcBef>
+                <a:spcPts val="500"/>
+              </a:spcBef>
+              <a:buFont typeface="Arial" panose="020B0604020202020204" pitchFamily="34" charset="0"/>
+              <a:buChar char="•"/>
+              <a:defRPr sz="1800" kern="1200">
+                <a:solidFill>
+                  <a:schemeClr val="tx1"/>
+                </a:solidFill>
+                <a:latin typeface="+mn-lt"/>
+                <a:ea typeface="+mn-ea"/>
+                <a:cs typeface="+mn-cs"/>
+              </a:defRPr>
+            </a:lvl7pPr>
+            <a:lvl8pPr marL="3429000" indent="-228600" algn="l" defTabSz="914400" rtl="0" eaLnBrk="1" latinLnBrk="0" hangingPunct="1">
+              <a:lnSpc>
+                <a:spcPct val="90000"/>
+              </a:lnSpc>
+              <a:spcBef>
+                <a:spcPts val="500"/>
+              </a:spcBef>
+              <a:buFont typeface="Arial" panose="020B0604020202020204" pitchFamily="34" charset="0"/>
+              <a:buChar char="•"/>
+              <a:defRPr sz="1800" kern="1200">
+                <a:solidFill>
+                  <a:schemeClr val="tx1"/>
+                </a:solidFill>
+                <a:latin typeface="+mn-lt"/>
+                <a:ea typeface="+mn-ea"/>
+                <a:cs typeface="+mn-cs"/>
+              </a:defRPr>
+            </a:lvl8pPr>
+            <a:lvl9pPr marL="3886200" indent="-228600" algn="l" defTabSz="914400" rtl="0" eaLnBrk="1" latinLnBrk="0" hangingPunct="1">
+              <a:lnSpc>
+                <a:spcPct val="90000"/>
+              </a:lnSpc>
+              <a:spcBef>
+                <a:spcPts val="500"/>
+              </a:spcBef>
+              <a:buFont typeface="Arial" panose="020B0604020202020204" pitchFamily="34" charset="0"/>
+              <a:buChar char="•"/>
+              <a:defRPr sz="1800" kern="1200">
+                <a:solidFill>
+                  <a:schemeClr val="tx1"/>
+                </a:solidFill>
+                <a:latin typeface="+mn-lt"/>
+                <a:ea typeface="+mn-ea"/>
+                <a:cs typeface="+mn-cs"/>
+              </a:defRPr>
+            </a:lvl9pPr>
+          </a:lstStyle>
+          <a:p>
+            <a:pPr>
+              <a:spcAft>
+                <a:spcPts val="400"/>
+              </a:spcAft>
+              <a:buFont typeface="Wingdings" pitchFamily="2" charset="2"/>
+              <a:buChar char="Ø"/>
+            </a:pPr>
+            <a:r>
+              <a:rPr lang="en-US" sz="1400" dirty="0"/>
+              <a:t>Citizens with High Educational Attainment</a:t>
+            </a:r>
+          </a:p>
+          <a:p>
+            <a:pPr>
+              <a:spcAft>
+                <a:spcPts val="400"/>
+              </a:spcAft>
+              <a:buFont typeface="Wingdings" pitchFamily="2" charset="2"/>
+              <a:buChar char="Ø"/>
+            </a:pPr>
+            <a:r>
+              <a:rPr lang="en-US" sz="1400" dirty="0"/>
+              <a:t>Less Crime Rate</a:t>
+            </a:r>
+          </a:p>
+          <a:p>
+            <a:pPr>
+              <a:spcAft>
+                <a:spcPts val="400"/>
+              </a:spcAft>
+              <a:buFont typeface="Wingdings" pitchFamily="2" charset="2"/>
+              <a:buChar char="Ø"/>
+            </a:pPr>
+            <a:r>
+              <a:rPr lang="en-US" sz="1400" dirty="0"/>
+              <a:t>High African American population</a:t>
+            </a:r>
+          </a:p>
+          <a:p>
+            <a:pPr>
+              <a:spcAft>
+                <a:spcPts val="400"/>
+              </a:spcAft>
+              <a:buFont typeface="Wingdings" pitchFamily="2" charset="2"/>
+              <a:buChar char="Ø"/>
+            </a:pPr>
+            <a:r>
+              <a:rPr lang="en-US" sz="1400" dirty="0"/>
+              <a:t>Less Unemployment rate</a:t>
+            </a:r>
+          </a:p>
+        </p:txBody>
+      </p:sp>
+      <p:sp>
+        <p:nvSpPr>
+          <p:cNvPr id="14" name="Round Diagonal Corner of Rectangle 13">
+            <a:extLst>
+              <a:ext uri="{FF2B5EF4-FFF2-40B4-BE49-F238E27FC236}">
+                <a16:creationId xmlns:a16="http://schemas.microsoft.com/office/drawing/2014/main" id="{29EC5E6E-933E-F24F-BB2F-596817D50DD5}"/>
+              </a:ext>
+            </a:extLst>
+          </p:cNvPr>
+          <p:cNvSpPr/>
+          <p:nvPr/>
+        </p:nvSpPr>
+        <p:spPr>
+          <a:xfrm>
+            <a:off x="304800" y="3827059"/>
+            <a:ext cx="8534400" cy="2726142"/>
+          </a:xfrm>
+          <a:prstGeom prst="round2DiagRect">
+            <a:avLst/>
+          </a:prstGeom>
+          <a:noFill/>
+        </p:spPr>
+        <p:style>
+          <a:lnRef idx="1">
+            <a:schemeClr val="accent1"/>
+          </a:lnRef>
+          <a:fillRef idx="3">
+            <a:schemeClr val="accent1"/>
+          </a:fillRef>
+          <a:effectRef idx="2">
+            <a:schemeClr val="accent1"/>
+          </a:effectRef>
+          <a:fontRef idx="minor">
+            <a:schemeClr val="lt1"/>
+          </a:fontRef>
+        </p:style>
+        <p:txBody>
+          <a:bodyPr rtlCol="0" anchor="ctr"/>
+          <a:lstStyle/>
+          <a:p>
+            <a:pPr algn="ctr"/>
+            <a:endParaRPr lang="en-US"/>
           </a:p>
         </p:txBody>
       </p:sp>

</xml_diff>